<commit_message>
Draft 1.7 mesh  specs (waterdown from mesh 2.0)
</commit_message>
<xml_diff>
--- a/design/mesh_v2.pptx
+++ b/design/mesh_v2.pptx
@@ -249,7 +249,7 @@
           <a:p>
             <a:fld id="{68B4AB64-BB16-014D-AF59-00877FFB5348}" type="datetimeFigureOut">
               <a:rPr lang="en-US" smtClean="0"/>
-              <a:t>9/25/2018</a:t>
+              <a:t>9/27/2018</a:t>
             </a:fld>
             <a:endParaRPr lang="en-US"/>
           </a:p>
@@ -420,7 +420,7 @@
             <a:fld id="{5498D241-0AB7-BC44-80E8-F0A20AF46E9E}" type="datetimeFigureOut">
               <a:rPr lang="en-US" smtClean="0"/>
               <a:pPr/>
-              <a:t>9/25/2018</a:t>
+              <a:t>9/27/2018</a:t>
             </a:fld>
             <a:endParaRPr lang="en-US" dirty="0"/>
           </a:p>
@@ -845,7 +845,6 @@
               <a:rPr lang="en-US" dirty="0"/>
               <a:t>The Kentucky Champion Court contains 21,048.  11,830 are instanced.  There are 2,119 unique symbols.</a:t>
             </a:r>
-            <a:endParaRPr lang="en-US" dirty="0"/>
           </a:p>
         </p:txBody>
       </p:sp>
@@ -1180,7 +1179,7 @@
           <a:p>
             <a:fld id="{6EC91B51-25EE-0147-9293-37E16A70024E}" type="datetime1">
               <a:rPr lang="en-US" smtClean="0"/>
-              <a:t>9/25/2018</a:t>
+              <a:t>9/27/2018</a:t>
             </a:fld>
             <a:endParaRPr lang="en-US"/>
           </a:p>
@@ -1914,7 +1913,7 @@
           <a:p>
             <a:fld id="{5D6FA6FB-FDD3-A446-B5AE-30BBE73852D8}" type="datetime1">
               <a:rPr lang="en-US" smtClean="0"/>
-              <a:t>9/25/2018</a:t>
+              <a:t>9/27/2018</a:t>
             </a:fld>
             <a:endParaRPr lang="en-US"/>
           </a:p>
@@ -2116,7 +2115,7 @@
           <a:p>
             <a:fld id="{063D0726-017F-9249-8B2E-2A4DDB444ED8}" type="datetime1">
               <a:rPr lang="en-US" smtClean="0"/>
-              <a:t>9/25/2018</a:t>
+              <a:t>9/27/2018</a:t>
             </a:fld>
             <a:endParaRPr lang="en-US"/>
           </a:p>
@@ -2382,7 +2381,7 @@
           <a:p>
             <a:fld id="{1D77C214-390A-F944-BF27-73F37F4360F9}" type="datetime1">
               <a:rPr lang="en-US" smtClean="0"/>
-              <a:t>9/25/2018</a:t>
+              <a:t>9/27/2018</a:t>
             </a:fld>
             <a:endParaRPr lang="en-US"/>
           </a:p>
@@ -2647,7 +2646,7 @@
           <a:p>
             <a:fld id="{76225C2B-15EC-3348-B6CD-75D75F51F610}" type="datetime1">
               <a:rPr lang="en-US" smtClean="0"/>
-              <a:t>9/25/2018</a:t>
+              <a:t>9/27/2018</a:t>
             </a:fld>
             <a:endParaRPr lang="en-US"/>
           </a:p>
@@ -4327,7 +4326,7 @@
           <a:p>
             <a:fld id="{06DEFD86-78C4-084A-B0B5-04A7A3431B39}" type="datetime1">
               <a:rPr lang="en-US" smtClean="0"/>
-              <a:t>9/25/2018</a:t>
+              <a:t>9/27/2018</a:t>
             </a:fld>
             <a:endParaRPr lang="en-US"/>
           </a:p>
@@ -4627,7 +4626,7 @@
           <a:p>
             <a:fld id="{7D5DF95B-0B80-6A4D-A813-6F9D9F38EBA2}" type="datetime1">
               <a:rPr lang="en-US" smtClean="0"/>
-              <a:t>9/25/2018</a:t>
+              <a:t>9/27/2018</a:t>
             </a:fld>
             <a:endParaRPr lang="en-US"/>
           </a:p>
@@ -4959,7 +4958,7 @@
           <a:p>
             <a:fld id="{14E55AC9-5819-304B-AB8A-EC561A98EE59}" type="datetime1">
               <a:rPr lang="en-US" smtClean="0"/>
-              <a:t>9/25/2018</a:t>
+              <a:t>9/27/2018</a:t>
             </a:fld>
             <a:endParaRPr lang="en-US"/>
           </a:p>
@@ -5439,7 +5438,7 @@
           <a:p>
             <a:fld id="{9874F111-1245-FB4C-ACB7-129F68E66232}" type="datetime1">
               <a:rPr lang="en-US" smtClean="0"/>
-              <a:t>9/25/2018</a:t>
+              <a:t>9/27/2018</a:t>
             </a:fld>
             <a:endParaRPr lang="en-US"/>
           </a:p>
@@ -5622,7 +5621,7 @@
           <a:p>
             <a:fld id="{380C21C6-642C-6F4C-B53C-06F3F35CEF14}" type="datetime1">
               <a:rPr lang="en-US" smtClean="0"/>
-              <a:t>9/25/2018</a:t>
+              <a:t>9/27/2018</a:t>
             </a:fld>
             <a:endParaRPr lang="en-US"/>
           </a:p>
@@ -5804,7 +5803,7 @@
           <a:p>
             <a:fld id="{8A0E3BE2-FFFE-0B46-AE5A-CBB4C5FEC6FC}" type="datetime1">
               <a:rPr lang="en-US" smtClean="0"/>
-              <a:t>9/25/2018</a:t>
+              <a:t>9/27/2018</a:t>
             </a:fld>
             <a:endParaRPr lang="en-US"/>
           </a:p>
@@ -5959,7 +5958,7 @@
           <a:p>
             <a:fld id="{8861994C-B8B3-A740-949B-C8D716F26A7F}" type="datetime1">
               <a:rPr lang="en-US" smtClean="0"/>
-              <a:t>9/25/2018</a:t>
+              <a:t>9/27/2018</a:t>
             </a:fld>
             <a:endParaRPr lang="en-US"/>
           </a:p>
@@ -6706,7 +6705,7 @@
           <a:p>
             <a:fld id="{CF17F20F-8413-1548-BF61-558511100DB7}" type="datetime1">
               <a:rPr lang="en-US" smtClean="0"/>
-              <a:t>9/25/2018</a:t>
+              <a:t>9/27/2018</a:t>
             </a:fld>
             <a:endParaRPr lang="en-US"/>
           </a:p>
@@ -6967,7 +6966,7 @@
           <a:p>
             <a:fld id="{9CE7E69C-4D79-BB49-9350-1FEE210EB4F7}" type="datetime1">
               <a:rPr lang="en-US" smtClean="0"/>
-              <a:t>9/25/2018</a:t>
+              <a:t>9/27/2018</a:t>
             </a:fld>
             <a:endParaRPr lang="en-US"/>
           </a:p>
@@ -11176,10 +11175,10 @@
                 <a:latin typeface="Consolas" panose="020B0609020204030204" pitchFamily="49" charset="0"/>
                 <a:cs typeface="Consolas" panose="020B0609020204030204" pitchFamily="49" charset="0"/>
               </a:rPr>
-              <a:t>layers/0/nodes/</a:t>
-            </a:r>
-            <a:r>
-              <a:rPr lang="en-US" sz="1600" i="1" dirty="0" smtClean="0">
+              <a:t>layers/0/nodes</a:t>
+            </a:r>
+            <a:r>
+              <a:rPr lang="en-US" sz="1600" dirty="0" smtClean="0">
                 <a:solidFill>
                   <a:schemeClr val="accent3">
                     <a:lumMod val="60000"/>
@@ -11189,10 +11188,10 @@
                 <a:latin typeface="Consolas" panose="020B0609020204030204" pitchFamily="49" charset="0"/>
                 <a:cs typeface="Consolas" panose="020B0609020204030204" pitchFamily="49" charset="0"/>
               </a:rPr>
-              <a:t>{</a:t>
-            </a:r>
-            <a:r>
-              <a:rPr lang="en-US" sz="1600" i="1" dirty="0" err="1" smtClean="0">
+              <a:t>/</a:t>
+            </a:r>
+            <a:r>
+              <a:rPr lang="en-US" sz="1600" i="1" dirty="0" smtClean="0">
                 <a:solidFill>
                   <a:schemeClr val="accent3">
                     <a:lumMod val="60000"/>
@@ -11202,10 +11201,10 @@
                 <a:latin typeface="Consolas" panose="020B0609020204030204" pitchFamily="49" charset="0"/>
                 <a:cs typeface="Consolas" panose="020B0609020204030204" pitchFamily="49" charset="0"/>
               </a:rPr>
-              <a:t>node_id</a:t>
-            </a:r>
-            <a:r>
-              <a:rPr lang="en-US" sz="1600" i="1" dirty="0" smtClean="0">
+              <a:t>{</a:t>
+            </a:r>
+            <a:r>
+              <a:rPr lang="en-US" sz="1600" i="1" dirty="0" err="1" smtClean="0">
                 <a:solidFill>
                   <a:schemeClr val="accent3">
                     <a:lumMod val="60000"/>
@@ -11215,10 +11214,10 @@
                 <a:latin typeface="Consolas" panose="020B0609020204030204" pitchFamily="49" charset="0"/>
                 <a:cs typeface="Consolas" panose="020B0609020204030204" pitchFamily="49" charset="0"/>
               </a:rPr>
-              <a:t>}</a:t>
-            </a:r>
-            <a:r>
-              <a:rPr lang="en-US" sz="1600" dirty="0" smtClean="0">
+              <a:t>resource</a:t>
+            </a:r>
+            <a:r>
+              <a:rPr lang="en-US" sz="1600" i="1" dirty="0" err="1" smtClean="0">
                 <a:solidFill>
                   <a:schemeClr val="accent3">
                     <a:lumMod val="60000"/>
@@ -11228,10 +11227,10 @@
                 <a:latin typeface="Consolas" panose="020B0609020204030204" pitchFamily="49" charset="0"/>
                 <a:cs typeface="Consolas" panose="020B0609020204030204" pitchFamily="49" charset="0"/>
               </a:rPr>
-              <a:t>/textures/</a:t>
-            </a:r>
-            <a:r>
-              <a:rPr lang="en-US" sz="1600" b="1" dirty="0" smtClean="0">
+              <a:t>_id</a:t>
+            </a:r>
+            <a:r>
+              <a:rPr lang="en-US" sz="1600" i="1" dirty="0" smtClean="0">
                 <a:solidFill>
                   <a:schemeClr val="accent3">
                     <a:lumMod val="60000"/>
@@ -11241,7 +11240,7 @@
                 <a:latin typeface="Consolas" panose="020B0609020204030204" pitchFamily="49" charset="0"/>
                 <a:cs typeface="Consolas" panose="020B0609020204030204" pitchFamily="49" charset="0"/>
               </a:rPr>
-              <a:t>4</a:t>
+              <a:t>}</a:t>
             </a:r>
             <a:r>
               <a:rPr lang="en-US" sz="1600" dirty="0" smtClean="0">
@@ -11254,19 +11253,10 @@
                 <a:latin typeface="Consolas" panose="020B0609020204030204" pitchFamily="49" charset="0"/>
                 <a:cs typeface="Consolas" panose="020B0609020204030204" pitchFamily="49" charset="0"/>
               </a:rPr>
-              <a:t>.jpg</a:t>
-            </a:r>
-          </a:p>
-          <a:p>
-            <a:r>
-              <a:rPr lang="en-US" sz="1600" dirty="0">
-                <a:latin typeface="Consolas" panose="020B0609020204030204" pitchFamily="49" charset="0"/>
-                <a:cs typeface="Consolas" panose="020B0609020204030204" pitchFamily="49" charset="0"/>
-              </a:rPr>
-              <a:t>url: </a:t>
-            </a:r>
-            <a:r>
-              <a:rPr lang="en-US" sz="1600" dirty="0">
+              <a:t>/textures/</a:t>
+            </a:r>
+            <a:r>
+              <a:rPr lang="en-US" sz="1600" b="1" dirty="0" smtClean="0">
                 <a:solidFill>
                   <a:schemeClr val="accent3">
                     <a:lumMod val="60000"/>
@@ -11276,10 +11266,10 @@
                 <a:latin typeface="Consolas" panose="020B0609020204030204" pitchFamily="49" charset="0"/>
                 <a:cs typeface="Consolas" panose="020B0609020204030204" pitchFamily="49" charset="0"/>
               </a:rPr>
-              <a:t>/layers/0/nodes/</a:t>
-            </a:r>
-            <a:r>
-              <a:rPr lang="en-US" sz="1600" i="1" dirty="0">
+              <a:t>4</a:t>
+            </a:r>
+            <a:r>
+              <a:rPr lang="en-US" sz="1600" dirty="0" smtClean="0">
                 <a:solidFill>
                   <a:schemeClr val="accent3">
                     <a:lumMod val="60000"/>
@@ -11289,10 +11279,19 @@
                 <a:latin typeface="Consolas" panose="020B0609020204030204" pitchFamily="49" charset="0"/>
                 <a:cs typeface="Consolas" panose="020B0609020204030204" pitchFamily="49" charset="0"/>
               </a:rPr>
-              <a:t>{</a:t>
-            </a:r>
-            <a:r>
-              <a:rPr lang="en-US" sz="1600" i="1" dirty="0" err="1">
+              <a:t>.jpg</a:t>
+            </a:r>
+          </a:p>
+          <a:p>
+            <a:r>
+              <a:rPr lang="en-US" sz="1600" dirty="0">
+                <a:latin typeface="Consolas" panose="020B0609020204030204" pitchFamily="49" charset="0"/>
+                <a:cs typeface="Consolas" panose="020B0609020204030204" pitchFamily="49" charset="0"/>
+              </a:rPr>
+              <a:t>url: </a:t>
+            </a:r>
+            <a:r>
+              <a:rPr lang="en-US" sz="1600" dirty="0">
                 <a:solidFill>
                   <a:schemeClr val="accent3">
                     <a:lumMod val="60000"/>
@@ -11302,10 +11301,10 @@
                 <a:latin typeface="Consolas" panose="020B0609020204030204" pitchFamily="49" charset="0"/>
                 <a:cs typeface="Consolas" panose="020B0609020204030204" pitchFamily="49" charset="0"/>
               </a:rPr>
-              <a:t>node_id</a:t>
-            </a:r>
-            <a:r>
-              <a:rPr lang="en-US" sz="1600" i="1" dirty="0">
+              <a:t>/layers/0/nodes</a:t>
+            </a:r>
+            <a:r>
+              <a:rPr lang="en-US" sz="1600" dirty="0" smtClean="0">
                 <a:solidFill>
                   <a:schemeClr val="accent3">
                     <a:lumMod val="60000"/>
@@ -11315,10 +11314,10 @@
                 <a:latin typeface="Consolas" panose="020B0609020204030204" pitchFamily="49" charset="0"/>
                 <a:cs typeface="Consolas" panose="020B0609020204030204" pitchFamily="49" charset="0"/>
               </a:rPr>
-              <a:t>}</a:t>
-            </a:r>
-            <a:r>
-              <a:rPr lang="en-US" sz="1600" dirty="0">
+              <a:t>/</a:t>
+            </a:r>
+            <a:r>
+              <a:rPr lang="en-US" sz="1600" i="1" dirty="0">
                 <a:solidFill>
                   <a:schemeClr val="accent3">
                     <a:lumMod val="60000"/>
@@ -11328,10 +11327,10 @@
                 <a:latin typeface="Consolas" panose="020B0609020204030204" pitchFamily="49" charset="0"/>
                 <a:cs typeface="Consolas" panose="020B0609020204030204" pitchFamily="49" charset="0"/>
               </a:rPr>
-              <a:t>/</a:t>
-            </a:r>
-            <a:r>
-              <a:rPr lang="en-US" sz="1600" dirty="0" smtClean="0">
+              <a:t>{</a:t>
+            </a:r>
+            <a:r>
+              <a:rPr lang="en-US" sz="1600" i="1" dirty="0" err="1">
                 <a:solidFill>
                   <a:schemeClr val="accent3">
                     <a:lumMod val="60000"/>
@@ -11341,10 +11340,10 @@
                 <a:latin typeface="Consolas" panose="020B0609020204030204" pitchFamily="49" charset="0"/>
                 <a:cs typeface="Consolas" panose="020B0609020204030204" pitchFamily="49" charset="0"/>
               </a:rPr>
-              <a:t>textures/</a:t>
-            </a:r>
-            <a:r>
-              <a:rPr lang="en-US" sz="1600" b="1" dirty="0" smtClean="0">
+              <a:t>resource_id</a:t>
+            </a:r>
+            <a:r>
+              <a:rPr lang="en-US" sz="1600" i="1" dirty="0">
                 <a:solidFill>
                   <a:schemeClr val="accent3">
                     <a:lumMod val="60000"/>
@@ -11354,10 +11353,10 @@
                 <a:latin typeface="Consolas" panose="020B0609020204030204" pitchFamily="49" charset="0"/>
                 <a:cs typeface="Consolas" panose="020B0609020204030204" pitchFamily="49" charset="0"/>
               </a:rPr>
-              <a:t>1</a:t>
-            </a:r>
-            <a:r>
-              <a:rPr lang="en-US" sz="1600" dirty="0" smtClean="0">
+              <a:t>}</a:t>
+            </a:r>
+            <a:r>
+              <a:rPr lang="en-US" sz="1600" dirty="0">
                 <a:solidFill>
                   <a:schemeClr val="accent3">
                     <a:lumMod val="60000"/>
@@ -11367,19 +11366,10 @@
                 <a:latin typeface="Consolas" panose="020B0609020204030204" pitchFamily="49" charset="0"/>
                 <a:cs typeface="Consolas" panose="020B0609020204030204" pitchFamily="49" charset="0"/>
               </a:rPr>
-              <a:t>.dds</a:t>
-            </a:r>
-          </a:p>
-          <a:p>
-            <a:r>
-              <a:rPr lang="en-US" sz="1600" dirty="0">
-                <a:latin typeface="Consolas" panose="020B0609020204030204" pitchFamily="49" charset="0"/>
-                <a:cs typeface="Consolas" panose="020B0609020204030204" pitchFamily="49" charset="0"/>
-              </a:rPr>
-              <a:t>url: </a:t>
-            </a:r>
-            <a:r>
-              <a:rPr lang="en-US" sz="1600" dirty="0">
+              <a:t>/</a:t>
+            </a:r>
+            <a:r>
+              <a:rPr lang="en-US" sz="1600" dirty="0" smtClean="0">
                 <a:solidFill>
                   <a:schemeClr val="accent3">
                     <a:lumMod val="60000"/>
@@ -11389,10 +11379,10 @@
                 <a:latin typeface="Consolas" panose="020B0609020204030204" pitchFamily="49" charset="0"/>
                 <a:cs typeface="Consolas" panose="020B0609020204030204" pitchFamily="49" charset="0"/>
               </a:rPr>
-              <a:t>/layers/0/nodes/</a:t>
-            </a:r>
-            <a:r>
-              <a:rPr lang="en-US" sz="1600" i="1" dirty="0">
+              <a:t>textures/</a:t>
+            </a:r>
+            <a:r>
+              <a:rPr lang="en-US" sz="1600" b="1" dirty="0" smtClean="0">
                 <a:solidFill>
                   <a:schemeClr val="accent3">
                     <a:lumMod val="60000"/>
@@ -11402,10 +11392,10 @@
                 <a:latin typeface="Consolas" panose="020B0609020204030204" pitchFamily="49" charset="0"/>
                 <a:cs typeface="Consolas" panose="020B0609020204030204" pitchFamily="49" charset="0"/>
               </a:rPr>
-              <a:t>{</a:t>
-            </a:r>
-            <a:r>
-              <a:rPr lang="en-US" sz="1600" i="1" dirty="0" err="1">
+              <a:t>1</a:t>
+            </a:r>
+            <a:r>
+              <a:rPr lang="en-US" sz="1600" dirty="0" smtClean="0">
                 <a:solidFill>
                   <a:schemeClr val="accent3">
                     <a:lumMod val="60000"/>
@@ -11415,7 +11405,68 @@
                 <a:latin typeface="Consolas" panose="020B0609020204030204" pitchFamily="49" charset="0"/>
                 <a:cs typeface="Consolas" panose="020B0609020204030204" pitchFamily="49" charset="0"/>
               </a:rPr>
-              <a:t>node_id</a:t>
+              <a:t>.dds</a:t>
+            </a:r>
+          </a:p>
+          <a:p>
+            <a:r>
+              <a:rPr lang="en-US" sz="1600" dirty="0">
+                <a:latin typeface="Consolas" panose="020B0609020204030204" pitchFamily="49" charset="0"/>
+                <a:cs typeface="Consolas" panose="020B0609020204030204" pitchFamily="49" charset="0"/>
+              </a:rPr>
+              <a:t>url: </a:t>
+            </a:r>
+            <a:r>
+              <a:rPr lang="en-US" sz="1600" dirty="0">
+                <a:solidFill>
+                  <a:schemeClr val="accent3">
+                    <a:lumMod val="60000"/>
+                    <a:lumOff val="40000"/>
+                  </a:schemeClr>
+                </a:solidFill>
+                <a:latin typeface="Consolas" panose="020B0609020204030204" pitchFamily="49" charset="0"/>
+                <a:cs typeface="Consolas" panose="020B0609020204030204" pitchFamily="49" charset="0"/>
+              </a:rPr>
+              <a:t>/layers/0/nodes</a:t>
+            </a:r>
+            <a:r>
+              <a:rPr lang="en-US" sz="1600" dirty="0" smtClean="0">
+                <a:solidFill>
+                  <a:schemeClr val="accent3">
+                    <a:lumMod val="60000"/>
+                    <a:lumOff val="40000"/>
+                  </a:schemeClr>
+                </a:solidFill>
+                <a:latin typeface="Consolas" panose="020B0609020204030204" pitchFamily="49" charset="0"/>
+                <a:cs typeface="Consolas" panose="020B0609020204030204" pitchFamily="49" charset="0"/>
+              </a:rPr>
+              <a:t>/</a:t>
+            </a:r>
+            <a:r>
+              <a:rPr lang="en-US" sz="1600" i="1" dirty="0">
+                <a:solidFill>
+                  <a:schemeClr val="accent3">
+                    <a:lumMod val="60000"/>
+                    <a:lumOff val="40000"/>
+                  </a:schemeClr>
+                </a:solidFill>
+                <a:latin typeface="Consolas" panose="020B0609020204030204" pitchFamily="49" charset="0"/>
+                <a:cs typeface="Consolas" panose="020B0609020204030204" pitchFamily="49" charset="0"/>
+              </a:rPr>
+              <a:t>{</a:t>
+            </a:r>
+            <a:r>
+              <a:rPr lang="en-US" sz="1600" i="1" dirty="0" err="1">
+                <a:solidFill>
+                  <a:schemeClr val="accent3">
+                    <a:lumMod val="60000"/>
+                    <a:lumOff val="40000"/>
+                  </a:schemeClr>
+                </a:solidFill>
+                <a:latin typeface="Consolas" panose="020B0609020204030204" pitchFamily="49" charset="0"/>
+                <a:cs typeface="Consolas" panose="020B0609020204030204" pitchFamily="49" charset="0"/>
+              </a:rPr>
+              <a:t>resource_id</a:t>
             </a:r>
             <a:r>
               <a:rPr lang="en-US" sz="1600" i="1" dirty="0">
@@ -13021,13 +13072,8 @@
             </a:r>
             <a:r>
               <a:rPr lang="en-US" dirty="0" smtClean="0"/>
-              <a:t>(instead of </a:t>
-            </a:r>
-            <a:r>
-              <a:rPr lang="en-US" dirty="0" smtClean="0"/>
-              <a:t>27) </a:t>
-            </a:r>
-            <a:endParaRPr lang="en-US" dirty="0" smtClean="0"/>
+              <a:t>(instead of 27) </a:t>
+            </a:r>
           </a:p>
         </p:txBody>
       </p:sp>
@@ -14162,17 +14208,7 @@
                           <a:effectLst/>
                           <a:latin typeface="Arial Narrow" panose="020B0606020202030204" pitchFamily="34" charset="0"/>
                         </a:rPr>
-                        <a:t># </a:t>
-                      </a:r>
-                      <a:r>
-                        <a:rPr lang="en-US" sz="1800" b="0" i="0" u="none" strike="noStrike" dirty="0" smtClean="0">
-                          <a:solidFill>
-                            <a:schemeClr val="tx1"/>
-                          </a:solidFill>
-                          <a:effectLst/>
-                          <a:latin typeface="Arial Narrow" panose="020B0606020202030204" pitchFamily="34" charset="0"/>
-                        </a:rPr>
-                        <a:t>datasets with</a:t>
+                        <a:t># datasets with</a:t>
                       </a:r>
                       <a:r>
                         <a:rPr lang="en-US" sz="1800" b="0" i="0" u="none" strike="noStrike" baseline="0" dirty="0" smtClean="0">
@@ -14182,17 +14218,7 @@
                           <a:effectLst/>
                           <a:latin typeface="Arial Narrow" panose="020B0606020202030204" pitchFamily="34" charset="0"/>
                         </a:rPr>
-                        <a:t> </a:t>
-                      </a:r>
-                      <a:r>
-                        <a:rPr lang="en-US" sz="1800" b="0" i="0" u="none" strike="noStrike" baseline="0" dirty="0" smtClean="0">
-                          <a:solidFill>
-                            <a:schemeClr val="tx1"/>
-                          </a:solidFill>
-                          <a:effectLst/>
-                          <a:latin typeface="Arial Narrow" panose="020B0606020202030204" pitchFamily="34" charset="0"/>
-                        </a:rPr>
-                        <a:t>p</a:t>
+                        <a:t> p</a:t>
                       </a:r>
                       <a:r>
                         <a:rPr lang="en-US" sz="1800" b="0" i="0" u="none" strike="noStrike" dirty="0" smtClean="0">
@@ -16256,11 +16282,7 @@
             </a:r>
             <a:r>
               <a:rPr lang="en-US" dirty="0" smtClean="0"/>
-              <a:t>more SL </a:t>
-            </a:r>
-            <a:r>
-              <a:rPr lang="en-US" dirty="0" smtClean="0"/>
-              <a:t>types: 3DObject</a:t>
+              <a:t>more SL types: 3DObject</a:t>
             </a:r>
             <a:r>
               <a:rPr lang="en-US" dirty="0"/>
@@ -16329,14 +16351,6 @@
               </a:rPr>
               <a:t>Challenge:</a:t>
             </a:r>
-            <a:endParaRPr lang="en-US" dirty="0" smtClean="0">
-              <a:solidFill>
-                <a:schemeClr val="accent3">
-                  <a:lumMod val="60000"/>
-                  <a:lumOff val="40000"/>
-                </a:schemeClr>
-              </a:solidFill>
-            </a:endParaRPr>
           </a:p>
           <a:p>
             <a:r>
@@ -16817,10 +16831,17 @@
               <a:t>sharedResource</a:t>
             </a:r>
             <a:r>
-              <a:rPr lang="en-US" b="0" dirty="0"/>
+              <a:rPr lang="en-US" b="0" i="1" dirty="0" smtClean="0"/>
+              <a:t>, </a:t>
+            </a:r>
+            <a:r>
+              <a:rPr lang="en-US" b="0" i="1" dirty="0" err="1" smtClean="0"/>
+              <a:t>featureData</a:t>
+            </a:r>
+            <a:r>
+              <a:rPr lang="en-US" b="0" dirty="0" smtClean="0"/>
               <a:t>)</a:t>
             </a:r>
-            <a:endParaRPr lang="en-US" b="0" dirty="0" smtClean="0"/>
           </a:p>
           <a:p>
             <a:pPr>
@@ -21499,135 +21520,10 @@
 </file>
 
 <file path=customXml/item15.xml><?xml version="1.0" encoding="utf-8"?>
-<ct:contentTypeSchema xmlns:ct="http://schemas.microsoft.com/office/2006/metadata/contentType" xmlns:ma="http://schemas.microsoft.com/office/2006/metadata/properties/metaAttributes" ct:_="" ma:_="" ma:contentTypeName="Document" ma:contentTypeID="0x0101007CCB09B909685840A5AA5DC537182835" ma:contentTypeVersion="1" ma:contentTypeDescription="Create a new document." ma:contentTypeScope="" ma:versionID="647b6714bcbd012a02104274568241a2">
-  <xsd:schema xmlns:xsd="http://www.w3.org/2001/XMLSchema" xmlns:xs="http://www.w3.org/2001/XMLSchema" xmlns:p="http://schemas.microsoft.com/office/2006/metadata/properties" xmlns:ns1="http://schemas.microsoft.com/sharepoint/v3" targetNamespace="http://schemas.microsoft.com/office/2006/metadata/properties" ma:root="true" ma:fieldsID="4dcce58c87e9fcebab8021569449a8d0" ns1:_="">
-    <xsd:import namespace="http://schemas.microsoft.com/sharepoint/v3"/>
-    <xsd:element name="properties">
-      <xsd:complexType>
-        <xsd:sequence>
-          <xsd:element name="documentManagement">
-            <xsd:complexType>
-              <xsd:all>
-                <xsd:element ref="ns1:PublishingStartDate" minOccurs="0"/>
-                <xsd:element ref="ns1:PublishingExpirationDate" minOccurs="0"/>
-              </xsd:all>
-            </xsd:complexType>
-          </xsd:element>
-        </xsd:sequence>
-      </xsd:complexType>
-    </xsd:element>
-  </xsd:schema>
-  <xsd:schema xmlns:xsd="http://www.w3.org/2001/XMLSchema" xmlns:xs="http://www.w3.org/2001/XMLSchema" xmlns:dms="http://schemas.microsoft.com/office/2006/documentManagement/types" xmlns:pc="http://schemas.microsoft.com/office/infopath/2007/PartnerControls" targetNamespace="http://schemas.microsoft.com/sharepoint/v3" elementFormDefault="qualified">
-    <xsd:import namespace="http://schemas.microsoft.com/office/2006/documentManagement/types"/>
-    <xsd:import namespace="http://schemas.microsoft.com/office/infopath/2007/PartnerControls"/>
-    <xsd:element name="PublishingStartDate" ma:index="8" nillable="true" ma:displayName="Scheduling Start Date" ma:description="Scheduling Start Date is a site column created by the Publishing feature. It is used to specify the date and time on which this page will first appear to site visitors." ma:internalName="PublishingStartDate">
-      <xsd:simpleType>
-        <xsd:restriction base="dms:Unknown"/>
-      </xsd:simpleType>
-    </xsd:element>
-    <xsd:element name="PublishingExpirationDate" ma:index="9" nillable="true" ma:displayName="Scheduling End Date" ma:description="Scheduling End Date is a site column created by the Publishing feature. It is used to specify the date and time on which this page will no longer appear to site visitors." ma:internalName="PublishingExpirationDate">
-      <xsd:simpleType>
-        <xsd:restriction base="dms:Unknown"/>
-      </xsd:simpleType>
-    </xsd:element>
-  </xsd:schema>
-  <xsd:schema xmlns="http://schemas.openxmlformats.org/package/2006/metadata/core-properties" xmlns:xsd="http://www.w3.org/2001/XMLSchema" xmlns:xsi="http://www.w3.org/2001/XMLSchema-instance" xmlns:dc="http://purl.org/dc/elements/1.1/" xmlns:dcterms="http://purl.org/dc/terms/" xmlns:odoc="http://schemas.microsoft.com/internal/obd" targetNamespace="http://schemas.openxmlformats.org/package/2006/metadata/core-properties" elementFormDefault="qualified" attributeFormDefault="unqualified" blockDefault="#all">
-    <xsd:import namespace="http://purl.org/dc/elements/1.1/" schemaLocation="http://dublincore.org/schemas/xmls/qdc/2003/04/02/dc.xsd"/>
-    <xsd:import namespace="http://purl.org/dc/terms/" schemaLocation="http://dublincore.org/schemas/xmls/qdc/2003/04/02/dcterms.xsd"/>
-    <xsd:element name="coreProperties" type="CT_coreProperties"/>
-    <xsd:complexType name="CT_coreProperties">
-      <xsd:all>
-        <xsd:element ref="dc:creator" minOccurs="0" maxOccurs="1"/>
-        <xsd:element ref="dcterms:created" minOccurs="0" maxOccurs="1"/>
-        <xsd:element ref="dc:identifier" minOccurs="0" maxOccurs="1"/>
-        <xsd:element name="contentType" minOccurs="0" maxOccurs="1" type="xsd:string" ma:index="0" ma:displayName="Content Type"/>
-        <xsd:element ref="dc:title" minOccurs="0" maxOccurs="1" ma:index="4" ma:displayName="Title"/>
-        <xsd:element ref="dc:subject" minOccurs="0" maxOccurs="1"/>
-        <xsd:element ref="dc:description" minOccurs="0" maxOccurs="1"/>
-        <xsd:element name="keywords" minOccurs="0" maxOccurs="1" type="xsd:string"/>
-        <xsd:element ref="dc:language" minOccurs="0" maxOccurs="1"/>
-        <xsd:element name="category" minOccurs="0" maxOccurs="1" type="xsd:string"/>
-        <xsd:element name="version" minOccurs="0" maxOccurs="1" type="xsd:string"/>
-        <xsd:element name="revision" minOccurs="0" maxOccurs="1" type="xsd:string">
-          <xsd:annotation>
-            <xsd:documentation>
-                        This value indicates the number of saves or revisions. The application is responsible for updating this value after each revision.
-                    </xsd:documentation>
-          </xsd:annotation>
-        </xsd:element>
-        <xsd:element name="lastModifiedBy" minOccurs="0" maxOccurs="1" type="xsd:string"/>
-        <xsd:element ref="dcterms:modified" minOccurs="0" maxOccurs="1"/>
-        <xsd:element name="contentStatus" minOccurs="0" maxOccurs="1" type="xsd:string"/>
-      </xsd:all>
-    </xsd:complexType>
-  </xsd:schema>
-  <xs:schema xmlns:pc="http://schemas.microsoft.com/office/infopath/2007/PartnerControls" xmlns:xs="http://www.w3.org/2001/XMLSchema" targetNamespace="http://schemas.microsoft.com/office/infopath/2007/PartnerControls" elementFormDefault="qualified" attributeFormDefault="unqualified">
-    <xs:element name="Person">
-      <xs:complexType>
-        <xs:sequence>
-          <xs:element ref="pc:DisplayName" minOccurs="0"/>
-          <xs:element ref="pc:AccountId" minOccurs="0"/>
-          <xs:element ref="pc:AccountType" minOccurs="0"/>
-        </xs:sequence>
-      </xs:complexType>
-    </xs:element>
-    <xs:element name="DisplayName" type="xs:string"/>
-    <xs:element name="AccountId" type="xs:string"/>
-    <xs:element name="AccountType" type="xs:string"/>
-    <xs:element name="BDCAssociatedEntity">
-      <xs:complexType>
-        <xs:sequence>
-          <xs:element ref="pc:BDCEntity" minOccurs="0" maxOccurs="unbounded"/>
-        </xs:sequence>
-        <xs:attribute ref="pc:EntityNamespace"/>
-        <xs:attribute ref="pc:EntityName"/>
-        <xs:attribute ref="pc:SystemInstanceName"/>
-        <xs:attribute ref="pc:AssociationName"/>
-      </xs:complexType>
-    </xs:element>
-    <xs:attribute name="EntityNamespace" type="xs:string"/>
-    <xs:attribute name="EntityName" type="xs:string"/>
-    <xs:attribute name="SystemInstanceName" type="xs:string"/>
-    <xs:attribute name="AssociationName" type="xs:string"/>
-    <xs:element name="BDCEntity">
-      <xs:complexType>
-        <xs:sequence>
-          <xs:element ref="pc:EntityDisplayName" minOccurs="0"/>
-          <xs:element ref="pc:EntityInstanceReference" minOccurs="0"/>
-          <xs:element ref="pc:EntityId1" minOccurs="0"/>
-          <xs:element ref="pc:EntityId2" minOccurs="0"/>
-          <xs:element ref="pc:EntityId3" minOccurs="0"/>
-          <xs:element ref="pc:EntityId4" minOccurs="0"/>
-          <xs:element ref="pc:EntityId5" minOccurs="0"/>
-        </xs:sequence>
-      </xs:complexType>
-    </xs:element>
-    <xs:element name="EntityDisplayName" type="xs:string"/>
-    <xs:element name="EntityInstanceReference" type="xs:string"/>
-    <xs:element name="EntityId1" type="xs:string"/>
-    <xs:element name="EntityId2" type="xs:string"/>
-    <xs:element name="EntityId3" type="xs:string"/>
-    <xs:element name="EntityId4" type="xs:string"/>
-    <xs:element name="EntityId5" type="xs:string"/>
-    <xs:element name="Terms">
-      <xs:complexType>
-        <xs:sequence>
-          <xs:element ref="pc:TermInfo" minOccurs="0" maxOccurs="unbounded"/>
-        </xs:sequence>
-      </xs:complexType>
-    </xs:element>
-    <xs:element name="TermInfo">
-      <xs:complexType>
-        <xs:sequence>
-          <xs:element ref="pc:TermName" minOccurs="0"/>
-          <xs:element ref="pc:TermId" minOccurs="0"/>
-        </xs:sequence>
-      </xs:complexType>
-    </xs:element>
-    <xs:element name="TermName" type="xs:string"/>
-    <xs:element name="TermId" type="xs:string"/>
-  </xs:schema>
-</ct:contentTypeSchema>
+<EsriMapsInfo xmlns="ESRI.ArcGIS.Mapping.OfficeIntegration.PowerPointInfo">
+  <Version>Version1</Version>
+  <RequiresSignIn>False</RequiresSignIn>
+</EsriMapsInfo>
 </file>
 
 <file path=customXml/item16.xml><?xml version="1.0" encoding="utf-8"?>
@@ -21638,12 +21534,10 @@
 </file>
 
 <file path=customXml/item17.xml><?xml version="1.0" encoding="utf-8"?>
-<p:properties xmlns:p="http://schemas.microsoft.com/office/2006/metadata/properties" xmlns:xsi="http://www.w3.org/2001/XMLSchema-instance" xmlns:pc="http://schemas.microsoft.com/office/infopath/2007/PartnerControls">
-  <documentManagement>
-    <PublishingExpirationDate xmlns="http://schemas.microsoft.com/sharepoint/v3" xsi:nil="true"/>
-    <PublishingStartDate xmlns="http://schemas.microsoft.com/sharepoint/v3" xsi:nil="true"/>
-  </documentManagement>
-</p:properties>
+<EsriMapsInfo xmlns="ESRI.ArcGIS.Mapping.OfficeIntegration.PowerPointInfo">
+  <Version>Version1</Version>
+  <RequiresSignIn>False</RequiresSignIn>
+</EsriMapsInfo>
 </file>
 
 <file path=customXml/item18.xml><?xml version="1.0" encoding="utf-8"?>
@@ -21829,12 +21723,10 @@
 </file>
 
 <file path=customXml/item41.xml><?xml version="1.0" encoding="utf-8"?>
-<?mso-contentType ?>
-<FormTemplates xmlns="http://schemas.microsoft.com/sharepoint/v3/contenttype/forms">
-  <Display>DocumentLibraryForm</Display>
-  <Edit>DocumentLibraryForm</Edit>
-  <New>DocumentLibraryForm</New>
-</FormTemplates>
+<EsriMapsInfo xmlns="ESRI.ArcGIS.Mapping.OfficeIntegration.PowerPointInfo">
+  <Version>Version1</Version>
+  <RequiresSignIn>False</RequiresSignIn>
+</EsriMapsInfo>
 </file>
 
 <file path=customXml/item42.xml><?xml version="1.0" encoding="utf-8"?>
@@ -21887,10 +21779,12 @@
 </file>
 
 <file path=customXml/item49.xml><?xml version="1.0" encoding="utf-8"?>
-<EsriMapsInfo xmlns="ESRI.ArcGIS.Mapping.OfficeIntegration.PowerPointInfo">
-  <Version>Version1</Version>
-  <RequiresSignIn>False</RequiresSignIn>
-</EsriMapsInfo>
+<p:properties xmlns:p="http://schemas.microsoft.com/office/2006/metadata/properties" xmlns:xsi="http://www.w3.org/2001/XMLSchema-instance" xmlns:pc="http://schemas.microsoft.com/office/infopath/2007/PartnerControls">
+  <documentManagement>
+    <PublishingExpirationDate xmlns="http://schemas.microsoft.com/sharepoint/v3" xsi:nil="true"/>
+    <PublishingStartDate xmlns="http://schemas.microsoft.com/sharepoint/v3" xsi:nil="true"/>
+  </documentManagement>
+</p:properties>
 </file>
 
 <file path=customXml/item5.xml><?xml version="1.0" encoding="utf-8"?>
@@ -21901,10 +21795,135 @@
 </file>
 
 <file path=customXml/item50.xml><?xml version="1.0" encoding="utf-8"?>
-<EsriMapsInfo xmlns="ESRI.ArcGIS.Mapping.OfficeIntegration.PowerPointInfo">
-  <Version>Version1</Version>
-  <RequiresSignIn>False</RequiresSignIn>
-</EsriMapsInfo>
+<ct:contentTypeSchema xmlns:ct="http://schemas.microsoft.com/office/2006/metadata/contentType" xmlns:ma="http://schemas.microsoft.com/office/2006/metadata/properties/metaAttributes" ct:_="" ma:_="" ma:contentTypeName="Document" ma:contentTypeID="0x0101007CCB09B909685840A5AA5DC537182835" ma:contentTypeVersion="1" ma:contentTypeDescription="Create a new document." ma:contentTypeScope="" ma:versionID="647b6714bcbd012a02104274568241a2">
+  <xsd:schema xmlns:xsd="http://www.w3.org/2001/XMLSchema" xmlns:xs="http://www.w3.org/2001/XMLSchema" xmlns:p="http://schemas.microsoft.com/office/2006/metadata/properties" xmlns:ns1="http://schemas.microsoft.com/sharepoint/v3" targetNamespace="http://schemas.microsoft.com/office/2006/metadata/properties" ma:root="true" ma:fieldsID="4dcce58c87e9fcebab8021569449a8d0" ns1:_="">
+    <xsd:import namespace="http://schemas.microsoft.com/sharepoint/v3"/>
+    <xsd:element name="properties">
+      <xsd:complexType>
+        <xsd:sequence>
+          <xsd:element name="documentManagement">
+            <xsd:complexType>
+              <xsd:all>
+                <xsd:element ref="ns1:PublishingStartDate" minOccurs="0"/>
+                <xsd:element ref="ns1:PublishingExpirationDate" minOccurs="0"/>
+              </xsd:all>
+            </xsd:complexType>
+          </xsd:element>
+        </xsd:sequence>
+      </xsd:complexType>
+    </xsd:element>
+  </xsd:schema>
+  <xsd:schema xmlns:xsd="http://www.w3.org/2001/XMLSchema" xmlns:xs="http://www.w3.org/2001/XMLSchema" xmlns:dms="http://schemas.microsoft.com/office/2006/documentManagement/types" xmlns:pc="http://schemas.microsoft.com/office/infopath/2007/PartnerControls" targetNamespace="http://schemas.microsoft.com/sharepoint/v3" elementFormDefault="qualified">
+    <xsd:import namespace="http://schemas.microsoft.com/office/2006/documentManagement/types"/>
+    <xsd:import namespace="http://schemas.microsoft.com/office/infopath/2007/PartnerControls"/>
+    <xsd:element name="PublishingStartDate" ma:index="8" nillable="true" ma:displayName="Scheduling Start Date" ma:description="Scheduling Start Date is a site column created by the Publishing feature. It is used to specify the date and time on which this page will first appear to site visitors." ma:internalName="PublishingStartDate">
+      <xsd:simpleType>
+        <xsd:restriction base="dms:Unknown"/>
+      </xsd:simpleType>
+    </xsd:element>
+    <xsd:element name="PublishingExpirationDate" ma:index="9" nillable="true" ma:displayName="Scheduling End Date" ma:description="Scheduling End Date is a site column created by the Publishing feature. It is used to specify the date and time on which this page will no longer appear to site visitors." ma:internalName="PublishingExpirationDate">
+      <xsd:simpleType>
+        <xsd:restriction base="dms:Unknown"/>
+      </xsd:simpleType>
+    </xsd:element>
+  </xsd:schema>
+  <xsd:schema xmlns="http://schemas.openxmlformats.org/package/2006/metadata/core-properties" xmlns:xsd="http://www.w3.org/2001/XMLSchema" xmlns:xsi="http://www.w3.org/2001/XMLSchema-instance" xmlns:dc="http://purl.org/dc/elements/1.1/" xmlns:dcterms="http://purl.org/dc/terms/" xmlns:odoc="http://schemas.microsoft.com/internal/obd" targetNamespace="http://schemas.openxmlformats.org/package/2006/metadata/core-properties" elementFormDefault="qualified" attributeFormDefault="unqualified" blockDefault="#all">
+    <xsd:import namespace="http://purl.org/dc/elements/1.1/" schemaLocation="http://dublincore.org/schemas/xmls/qdc/2003/04/02/dc.xsd"/>
+    <xsd:import namespace="http://purl.org/dc/terms/" schemaLocation="http://dublincore.org/schemas/xmls/qdc/2003/04/02/dcterms.xsd"/>
+    <xsd:element name="coreProperties" type="CT_coreProperties"/>
+    <xsd:complexType name="CT_coreProperties">
+      <xsd:all>
+        <xsd:element ref="dc:creator" minOccurs="0" maxOccurs="1"/>
+        <xsd:element ref="dcterms:created" minOccurs="0" maxOccurs="1"/>
+        <xsd:element ref="dc:identifier" minOccurs="0" maxOccurs="1"/>
+        <xsd:element name="contentType" minOccurs="0" maxOccurs="1" type="xsd:string" ma:index="0" ma:displayName="Content Type"/>
+        <xsd:element ref="dc:title" minOccurs="0" maxOccurs="1" ma:index="4" ma:displayName="Title"/>
+        <xsd:element ref="dc:subject" minOccurs="0" maxOccurs="1"/>
+        <xsd:element ref="dc:description" minOccurs="0" maxOccurs="1"/>
+        <xsd:element name="keywords" minOccurs="0" maxOccurs="1" type="xsd:string"/>
+        <xsd:element ref="dc:language" minOccurs="0" maxOccurs="1"/>
+        <xsd:element name="category" minOccurs="0" maxOccurs="1" type="xsd:string"/>
+        <xsd:element name="version" minOccurs="0" maxOccurs="1" type="xsd:string"/>
+        <xsd:element name="revision" minOccurs="0" maxOccurs="1" type="xsd:string">
+          <xsd:annotation>
+            <xsd:documentation>
+                        This value indicates the number of saves or revisions. The application is responsible for updating this value after each revision.
+                    </xsd:documentation>
+          </xsd:annotation>
+        </xsd:element>
+        <xsd:element name="lastModifiedBy" minOccurs="0" maxOccurs="1" type="xsd:string"/>
+        <xsd:element ref="dcterms:modified" minOccurs="0" maxOccurs="1"/>
+        <xsd:element name="contentStatus" minOccurs="0" maxOccurs="1" type="xsd:string"/>
+      </xsd:all>
+    </xsd:complexType>
+  </xsd:schema>
+  <xs:schema xmlns:pc="http://schemas.microsoft.com/office/infopath/2007/PartnerControls" xmlns:xs="http://www.w3.org/2001/XMLSchema" targetNamespace="http://schemas.microsoft.com/office/infopath/2007/PartnerControls" elementFormDefault="qualified" attributeFormDefault="unqualified">
+    <xs:element name="Person">
+      <xs:complexType>
+        <xs:sequence>
+          <xs:element ref="pc:DisplayName" minOccurs="0"/>
+          <xs:element ref="pc:AccountId" minOccurs="0"/>
+          <xs:element ref="pc:AccountType" minOccurs="0"/>
+        </xs:sequence>
+      </xs:complexType>
+    </xs:element>
+    <xs:element name="DisplayName" type="xs:string"/>
+    <xs:element name="AccountId" type="xs:string"/>
+    <xs:element name="AccountType" type="xs:string"/>
+    <xs:element name="BDCAssociatedEntity">
+      <xs:complexType>
+        <xs:sequence>
+          <xs:element ref="pc:BDCEntity" minOccurs="0" maxOccurs="unbounded"/>
+        </xs:sequence>
+        <xs:attribute ref="pc:EntityNamespace"/>
+        <xs:attribute ref="pc:EntityName"/>
+        <xs:attribute ref="pc:SystemInstanceName"/>
+        <xs:attribute ref="pc:AssociationName"/>
+      </xs:complexType>
+    </xs:element>
+    <xs:attribute name="EntityNamespace" type="xs:string"/>
+    <xs:attribute name="EntityName" type="xs:string"/>
+    <xs:attribute name="SystemInstanceName" type="xs:string"/>
+    <xs:attribute name="AssociationName" type="xs:string"/>
+    <xs:element name="BDCEntity">
+      <xs:complexType>
+        <xs:sequence>
+          <xs:element ref="pc:EntityDisplayName" minOccurs="0"/>
+          <xs:element ref="pc:EntityInstanceReference" minOccurs="0"/>
+          <xs:element ref="pc:EntityId1" minOccurs="0"/>
+          <xs:element ref="pc:EntityId2" minOccurs="0"/>
+          <xs:element ref="pc:EntityId3" minOccurs="0"/>
+          <xs:element ref="pc:EntityId4" minOccurs="0"/>
+          <xs:element ref="pc:EntityId5" minOccurs="0"/>
+        </xs:sequence>
+      </xs:complexType>
+    </xs:element>
+    <xs:element name="EntityDisplayName" type="xs:string"/>
+    <xs:element name="EntityInstanceReference" type="xs:string"/>
+    <xs:element name="EntityId1" type="xs:string"/>
+    <xs:element name="EntityId2" type="xs:string"/>
+    <xs:element name="EntityId3" type="xs:string"/>
+    <xs:element name="EntityId4" type="xs:string"/>
+    <xs:element name="EntityId5" type="xs:string"/>
+    <xs:element name="Terms">
+      <xs:complexType>
+        <xs:sequence>
+          <xs:element ref="pc:TermInfo" minOccurs="0" maxOccurs="unbounded"/>
+        </xs:sequence>
+      </xs:complexType>
+    </xs:element>
+    <xs:element name="TermInfo">
+      <xs:complexType>
+        <xs:sequence>
+          <xs:element ref="pc:TermName" minOccurs="0"/>
+          <xs:element ref="pc:TermId" minOccurs="0"/>
+        </xs:sequence>
+      </xs:complexType>
+    </xs:element>
+    <xs:element name="TermName" type="xs:string"/>
+    <xs:element name="TermId" type="xs:string"/>
+  </xs:schema>
+</ct:contentTypeSchema>
 </file>
 
 <file path=customXml/item51.xml><?xml version="1.0" encoding="utf-8"?>
@@ -21957,10 +21976,12 @@
 </file>
 
 <file path=customXml/item58.xml><?xml version="1.0" encoding="utf-8"?>
-<EsriMapsInfo xmlns="ESRI.ArcGIS.Mapping.OfficeIntegration.PowerPointInfo">
-  <Version>Version1</Version>
-  <RequiresSignIn>False</RequiresSignIn>
-</EsriMapsInfo>
+<?mso-contentType ?>
+<FormTemplates xmlns="http://schemas.microsoft.com/sharepoint/v3/contenttype/forms">
+  <Display>DocumentLibraryForm</Display>
+  <Edit>DocumentLibraryForm</Edit>
+  <New>DocumentLibraryForm</New>
+</FormTemplates>
 </file>
 
 <file path=customXml/item59.xml><?xml version="1.0" encoding="utf-8"?>
@@ -22062,7 +22083,7 @@
 </file>
 
 <file path=customXml/itemProps1.xml><?xml version="1.0" encoding="utf-8"?>
-<ds:datastoreItem xmlns:ds="http://schemas.openxmlformats.org/officeDocument/2006/customXml" ds:itemID="{7A70D44C-B768-49FE-A70F-C6199D3EE9A7}">
+<ds:datastoreItem xmlns:ds="http://schemas.openxmlformats.org/officeDocument/2006/customXml" ds:itemID="{6D2D132B-596B-4D69-A43B-566EB6C10C03}">
   <ds:schemaRefs>
     <ds:schemaRef ds:uri="ESRI.ArcGIS.Mapping.OfficeIntegration.PowerPointInfo"/>
   </ds:schemaRefs>
@@ -22070,7 +22091,7 @@
 </file>
 
 <file path=customXml/itemProps10.xml><?xml version="1.0" encoding="utf-8"?>
-<ds:datastoreItem xmlns:ds="http://schemas.openxmlformats.org/officeDocument/2006/customXml" ds:itemID="{AE5A340C-916E-449C-AA30-CD41B151A0D4}">
+<ds:datastoreItem xmlns:ds="http://schemas.openxmlformats.org/officeDocument/2006/customXml" ds:itemID="{5B58CDD1-2BF6-415B-A256-DBBCC6A48D56}">
   <ds:schemaRefs>
     <ds:schemaRef ds:uri="ESRI.ArcGIS.Mapping.OfficeIntegration.PowerPointInfo"/>
   </ds:schemaRefs>
@@ -22078,6 +22099,30 @@
 </file>
 
 <file path=customXml/itemProps11.xml><?xml version="1.0" encoding="utf-8"?>
+<ds:datastoreItem xmlns:ds="http://schemas.openxmlformats.org/officeDocument/2006/customXml" ds:itemID="{3A5DA3C3-46A0-47F8-855A-99C7684A98A2}">
+  <ds:schemaRefs>
+    <ds:schemaRef ds:uri="ESRI.ArcGIS.Mapping.OfficeIntegration.PowerPointInfo"/>
+  </ds:schemaRefs>
+</ds:datastoreItem>
+</file>
+
+<file path=customXml/itemProps12.xml><?xml version="1.0" encoding="utf-8"?>
+<ds:datastoreItem xmlns:ds="http://schemas.openxmlformats.org/officeDocument/2006/customXml" ds:itemID="{B0302D17-5923-4CC0-9EB4-0E57930F5A8E}">
+  <ds:schemaRefs>
+    <ds:schemaRef ds:uri="ESRI.ArcGIS.Mapping.OfficeIntegration.PowerPointInfo"/>
+  </ds:schemaRefs>
+</ds:datastoreItem>
+</file>
+
+<file path=customXml/itemProps13.xml><?xml version="1.0" encoding="utf-8"?>
+<ds:datastoreItem xmlns:ds="http://schemas.openxmlformats.org/officeDocument/2006/customXml" ds:itemID="{22A42D4B-0AAE-44C9-A2EF-48BDE1C5260A}">
+  <ds:schemaRefs>
+    <ds:schemaRef ds:uri="ESRI.ArcGIS.Mapping.OfficeIntegration.PowerPointInfo"/>
+  </ds:schemaRefs>
+</ds:datastoreItem>
+</file>
+
+<file path=customXml/itemProps14.xml><?xml version="1.0" encoding="utf-8"?>
 <ds:datastoreItem xmlns:ds="http://schemas.openxmlformats.org/officeDocument/2006/customXml" ds:itemID="{096117C4-1661-4D3B-B9F6-BC19E0F3E90B}">
   <ds:schemaRefs>
     <ds:schemaRef ds:uri="ESRI.ArcGIS.Mapping.OfficeIntegration.PowerPointInfo"/>
@@ -22085,7 +22130,55 @@
 </ds:datastoreItem>
 </file>
 
-<file path=customXml/itemProps12.xml><?xml version="1.0" encoding="utf-8"?>
+<file path=customXml/itemProps15.xml><?xml version="1.0" encoding="utf-8"?>
+<ds:datastoreItem xmlns:ds="http://schemas.openxmlformats.org/officeDocument/2006/customXml" ds:itemID="{7147CA22-2BC4-4917-83D2-7CA4C34A80D4}">
+  <ds:schemaRefs>
+    <ds:schemaRef ds:uri="ESRI.ArcGIS.Mapping.OfficeIntegration.PowerPointInfo"/>
+  </ds:schemaRefs>
+</ds:datastoreItem>
+</file>
+
+<file path=customXml/itemProps16.xml><?xml version="1.0" encoding="utf-8"?>
+<ds:datastoreItem xmlns:ds="http://schemas.openxmlformats.org/officeDocument/2006/customXml" ds:itemID="{AB25B40B-929A-4CD0-B9AB-7142442027B6}">
+  <ds:schemaRefs>
+    <ds:schemaRef ds:uri="ESRI.ArcGIS.Mapping.OfficeIntegration.PowerPointInfo"/>
+  </ds:schemaRefs>
+</ds:datastoreItem>
+</file>
+
+<file path=customXml/itemProps17.xml><?xml version="1.0" encoding="utf-8"?>
+<ds:datastoreItem xmlns:ds="http://schemas.openxmlformats.org/officeDocument/2006/customXml" ds:itemID="{A77C5B54-CA1C-4010-8D5D-ED406825EBB7}">
+  <ds:schemaRefs>
+    <ds:schemaRef ds:uri="ESRI.ArcGIS.Mapping.OfficeIntegration.PowerPointInfo"/>
+  </ds:schemaRefs>
+</ds:datastoreItem>
+</file>
+
+<file path=customXml/itemProps18.xml><?xml version="1.0" encoding="utf-8"?>
+<ds:datastoreItem xmlns:ds="http://schemas.openxmlformats.org/officeDocument/2006/customXml" ds:itemID="{C4AF463C-FA8B-436D-9853-3318650FDAB8}">
+  <ds:schemaRefs>
+    <ds:schemaRef ds:uri="ESRI.ArcGIS.Mapping.OfficeIntegration.PowerPointInfo"/>
+  </ds:schemaRefs>
+</ds:datastoreItem>
+</file>
+
+<file path=customXml/itemProps19.xml><?xml version="1.0" encoding="utf-8"?>
+<ds:datastoreItem xmlns:ds="http://schemas.openxmlformats.org/officeDocument/2006/customXml" ds:itemID="{C9037CA3-5499-457D-8238-F29CBEBDF143}">
+  <ds:schemaRefs>
+    <ds:schemaRef ds:uri="ESRI.ArcGIS.Mapping.OfficeIntegration.PowerPointInfo"/>
+  </ds:schemaRefs>
+</ds:datastoreItem>
+</file>
+
+<file path=customXml/itemProps2.xml><?xml version="1.0" encoding="utf-8"?>
+<ds:datastoreItem xmlns:ds="http://schemas.openxmlformats.org/officeDocument/2006/customXml" ds:itemID="{E940B40D-12DB-4BFA-BBB6-2269FD71FF92}">
+  <ds:schemaRefs>
+    <ds:schemaRef ds:uri="ESRI.ArcGIS.Mapping.OfficeIntegration.PowerPointInfo"/>
+  </ds:schemaRefs>
+</ds:datastoreItem>
+</file>
+
+<file path=customXml/itemProps20.xml><?xml version="1.0" encoding="utf-8"?>
 <ds:datastoreItem xmlns:ds="http://schemas.openxmlformats.org/officeDocument/2006/customXml" ds:itemID="{9DC677B7-6D9E-42B7-AD1F-75D1804EAF7D}">
   <ds:schemaRefs>
     <ds:schemaRef ds:uri="ESRI.ArcGIS.Mapping.OfficeIntegration.PowerPointInfo"/>
@@ -22093,23 +22186,271 @@
 </ds:datastoreItem>
 </file>
 
-<file path=customXml/itemProps13.xml><?xml version="1.0" encoding="utf-8"?>
-<ds:datastoreItem xmlns:ds="http://schemas.openxmlformats.org/officeDocument/2006/customXml" ds:itemID="{3A5DA3C3-46A0-47F8-855A-99C7684A98A2}">
+<file path=customXml/itemProps21.xml><?xml version="1.0" encoding="utf-8"?>
+<ds:datastoreItem xmlns:ds="http://schemas.openxmlformats.org/officeDocument/2006/customXml" ds:itemID="{D4E2A01F-BEC1-4558-9AD1-A87ED70D910B}">
   <ds:schemaRefs>
     <ds:schemaRef ds:uri="ESRI.ArcGIS.Mapping.OfficeIntegration.PowerPointInfo"/>
   </ds:schemaRefs>
 </ds:datastoreItem>
 </file>
 
-<file path=customXml/itemProps14.xml><?xml version="1.0" encoding="utf-8"?>
-<ds:datastoreItem xmlns:ds="http://schemas.openxmlformats.org/officeDocument/2006/customXml" ds:itemID="{71658D62-F010-45F1-9326-EDC465FED48E}">
+<file path=customXml/itemProps22.xml><?xml version="1.0" encoding="utf-8"?>
+<ds:datastoreItem xmlns:ds="http://schemas.openxmlformats.org/officeDocument/2006/customXml" ds:itemID="{EB8D7141-3508-4B4E-8051-37E3E4C09D17}">
   <ds:schemaRefs>
     <ds:schemaRef ds:uri="ESRI.ArcGIS.Mapping.OfficeIntegration.PowerPointInfo"/>
   </ds:schemaRefs>
 </ds:datastoreItem>
 </file>
 
-<file path=customXml/itemProps15.xml><?xml version="1.0" encoding="utf-8"?>
+<file path=customXml/itemProps23.xml><?xml version="1.0" encoding="utf-8"?>
+<ds:datastoreItem xmlns:ds="http://schemas.openxmlformats.org/officeDocument/2006/customXml" ds:itemID="{DE4ACD9E-0233-451D-890D-5732E05DB574}">
+  <ds:schemaRefs>
+    <ds:schemaRef ds:uri="ESRI.ArcGIS.Mapping.OfficeIntegration.PowerPointInfo"/>
+  </ds:schemaRefs>
+</ds:datastoreItem>
+</file>
+
+<file path=customXml/itemProps24.xml><?xml version="1.0" encoding="utf-8"?>
+<ds:datastoreItem xmlns:ds="http://schemas.openxmlformats.org/officeDocument/2006/customXml" ds:itemID="{3E253610-1BBE-4C16-A1DA-4D6F07A3A74E}">
+  <ds:schemaRefs>
+    <ds:schemaRef ds:uri="ESRI.ArcGIS.Mapping.OfficeIntegration.PowerPointInfo"/>
+  </ds:schemaRefs>
+</ds:datastoreItem>
+</file>
+
+<file path=customXml/itemProps25.xml><?xml version="1.0" encoding="utf-8"?>
+<ds:datastoreItem xmlns:ds="http://schemas.openxmlformats.org/officeDocument/2006/customXml" ds:itemID="{E559A846-F914-4753-A2DC-D33AFE44114C}">
+  <ds:schemaRefs>
+    <ds:schemaRef ds:uri="ESRI.ArcGIS.Mapping.OfficeIntegration.PowerPointInfo"/>
+  </ds:schemaRefs>
+</ds:datastoreItem>
+</file>
+
+<file path=customXml/itemProps26.xml><?xml version="1.0" encoding="utf-8"?>
+<ds:datastoreItem xmlns:ds="http://schemas.openxmlformats.org/officeDocument/2006/customXml" ds:itemID="{53220D22-8257-492D-8F60-ECE474D7C478}">
+  <ds:schemaRefs>
+    <ds:schemaRef ds:uri="ESRI.ArcGIS.Mapping.OfficeIntegration.PowerPointInfo"/>
+  </ds:schemaRefs>
+</ds:datastoreItem>
+</file>
+
+<file path=customXml/itemProps27.xml><?xml version="1.0" encoding="utf-8"?>
+<ds:datastoreItem xmlns:ds="http://schemas.openxmlformats.org/officeDocument/2006/customXml" ds:itemID="{F6EFD530-1E3E-47B8-A55C-19EC63E3C655}">
+  <ds:schemaRefs>
+    <ds:schemaRef ds:uri="ESRI.ArcGIS.Mapping.OfficeIntegration.PowerPointInfo"/>
+  </ds:schemaRefs>
+</ds:datastoreItem>
+</file>
+
+<file path=customXml/itemProps28.xml><?xml version="1.0" encoding="utf-8"?>
+<ds:datastoreItem xmlns:ds="http://schemas.openxmlformats.org/officeDocument/2006/customXml" ds:itemID="{FDE85643-3216-4103-A1BD-63F5E1D42D73}">
+  <ds:schemaRefs>
+    <ds:schemaRef ds:uri="ESRI.ArcGIS.Mapping.OfficeIntegration.PowerPointInfo"/>
+  </ds:schemaRefs>
+</ds:datastoreItem>
+</file>
+
+<file path=customXml/itemProps29.xml><?xml version="1.0" encoding="utf-8"?>
+<ds:datastoreItem xmlns:ds="http://schemas.openxmlformats.org/officeDocument/2006/customXml" ds:itemID="{86B5FFB5-BF2F-45EA-BC75-C41726A8F251}">
+  <ds:schemaRefs>
+    <ds:schemaRef ds:uri="ESRI.ArcGIS.Mapping.OfficeIntegration.PowerPointInfo"/>
+  </ds:schemaRefs>
+</ds:datastoreItem>
+</file>
+
+<file path=customXml/itemProps3.xml><?xml version="1.0" encoding="utf-8"?>
+<ds:datastoreItem xmlns:ds="http://schemas.openxmlformats.org/officeDocument/2006/customXml" ds:itemID="{C1BF2448-6CBA-44DB-9E22-BED59BA834DF}">
+  <ds:schemaRefs>
+    <ds:schemaRef ds:uri="ESRI.ArcGIS.Mapping.OfficeIntegration.PowerPointInfo"/>
+  </ds:schemaRefs>
+</ds:datastoreItem>
+</file>
+
+<file path=customXml/itemProps30.xml><?xml version="1.0" encoding="utf-8"?>
+<ds:datastoreItem xmlns:ds="http://schemas.openxmlformats.org/officeDocument/2006/customXml" ds:itemID="{2FE51124-E413-4DA5-9E06-A6EB32D0C127}">
+  <ds:schemaRefs>
+    <ds:schemaRef ds:uri="ESRI.ArcGIS.Mapping.OfficeIntegration.PowerPointInfo"/>
+  </ds:schemaRefs>
+</ds:datastoreItem>
+</file>
+
+<file path=customXml/itemProps31.xml><?xml version="1.0" encoding="utf-8"?>
+<ds:datastoreItem xmlns:ds="http://schemas.openxmlformats.org/officeDocument/2006/customXml" ds:itemID="{D6F15B81-7660-4E9F-B613-8AA4F84B6DA3}">
+  <ds:schemaRefs>
+    <ds:schemaRef ds:uri="ESRI.ArcGIS.Mapping.OfficeIntegration.PowerPointInfo"/>
+  </ds:schemaRefs>
+</ds:datastoreItem>
+</file>
+
+<file path=customXml/itemProps32.xml><?xml version="1.0" encoding="utf-8"?>
+<ds:datastoreItem xmlns:ds="http://schemas.openxmlformats.org/officeDocument/2006/customXml" ds:itemID="{998905D7-FE59-48DE-A74A-5B0009B7827F}">
+  <ds:schemaRefs>
+    <ds:schemaRef ds:uri="ESRI.ArcGIS.Mapping.OfficeIntegration.PowerPointInfo"/>
+  </ds:schemaRefs>
+</ds:datastoreItem>
+</file>
+
+<file path=customXml/itemProps33.xml><?xml version="1.0" encoding="utf-8"?>
+<ds:datastoreItem xmlns:ds="http://schemas.openxmlformats.org/officeDocument/2006/customXml" ds:itemID="{76859AF2-E75C-459B-8657-EEEA80BC8153}">
+  <ds:schemaRefs>
+    <ds:schemaRef ds:uri="ESRI.ArcGIS.Mapping.OfficeIntegration.PowerPointInfo"/>
+  </ds:schemaRefs>
+</ds:datastoreItem>
+</file>
+
+<file path=customXml/itemProps34.xml><?xml version="1.0" encoding="utf-8"?>
+<ds:datastoreItem xmlns:ds="http://schemas.openxmlformats.org/officeDocument/2006/customXml" ds:itemID="{94844715-80D4-4BDB-8DF0-52D9314E2485}">
+  <ds:schemaRefs>
+    <ds:schemaRef ds:uri="ESRI.ArcGIS.Mapping.OfficeIntegration.PowerPointInfo"/>
+  </ds:schemaRefs>
+</ds:datastoreItem>
+</file>
+
+<file path=customXml/itemProps35.xml><?xml version="1.0" encoding="utf-8"?>
+<ds:datastoreItem xmlns:ds="http://schemas.openxmlformats.org/officeDocument/2006/customXml" ds:itemID="{7684026F-E81F-4167-824A-3AA1BAEAE133}">
+  <ds:schemaRefs>
+    <ds:schemaRef ds:uri="ESRI.ArcGIS.Mapping.OfficeIntegration.PowerPointInfo"/>
+  </ds:schemaRefs>
+</ds:datastoreItem>
+</file>
+
+<file path=customXml/itemProps36.xml><?xml version="1.0" encoding="utf-8"?>
+<ds:datastoreItem xmlns:ds="http://schemas.openxmlformats.org/officeDocument/2006/customXml" ds:itemID="{F29452FE-972E-43F8-B54C-969F4C69C00B}">
+  <ds:schemaRefs>
+    <ds:schemaRef ds:uri="ESRI.ArcGIS.Mapping.OfficeIntegration.PowerPointInfo"/>
+  </ds:schemaRefs>
+</ds:datastoreItem>
+</file>
+
+<file path=customXml/itemProps37.xml><?xml version="1.0" encoding="utf-8"?>
+<ds:datastoreItem xmlns:ds="http://schemas.openxmlformats.org/officeDocument/2006/customXml" ds:itemID="{18DF8D07-6137-4D85-8010-4650942E033A}">
+  <ds:schemaRefs>
+    <ds:schemaRef ds:uri="ESRI.ArcGIS.Mapping.OfficeIntegration.PowerPointInfo"/>
+  </ds:schemaRefs>
+</ds:datastoreItem>
+</file>
+
+<file path=customXml/itemProps38.xml><?xml version="1.0" encoding="utf-8"?>
+<ds:datastoreItem xmlns:ds="http://schemas.openxmlformats.org/officeDocument/2006/customXml" ds:itemID="{D32008F3-64AC-45EB-A05B-F6120AE62290}">
+  <ds:schemaRefs>
+    <ds:schemaRef ds:uri="ESRI.ArcGIS.Mapping.OfficeIntegration.PowerPointInfo"/>
+  </ds:schemaRefs>
+</ds:datastoreItem>
+</file>
+
+<file path=customXml/itemProps39.xml><?xml version="1.0" encoding="utf-8"?>
+<ds:datastoreItem xmlns:ds="http://schemas.openxmlformats.org/officeDocument/2006/customXml" ds:itemID="{EE9F405B-FE7A-4AB8-9CB8-9A75FBA69A95}">
+  <ds:schemaRefs>
+    <ds:schemaRef ds:uri="ESRI.ArcGIS.Mapping.OfficeIntegration.PowerPointInfo"/>
+  </ds:schemaRefs>
+</ds:datastoreItem>
+</file>
+
+<file path=customXml/itemProps4.xml><?xml version="1.0" encoding="utf-8"?>
+<ds:datastoreItem xmlns:ds="http://schemas.openxmlformats.org/officeDocument/2006/customXml" ds:itemID="{9E8787D6-C7B8-48EC-8C13-4069AE6320BD}">
+  <ds:schemaRefs>
+    <ds:schemaRef ds:uri="ESRI.ArcGIS.Mapping.OfficeIntegration.PowerPointInfo"/>
+  </ds:schemaRefs>
+</ds:datastoreItem>
+</file>
+
+<file path=customXml/itemProps40.xml><?xml version="1.0" encoding="utf-8"?>
+<ds:datastoreItem xmlns:ds="http://schemas.openxmlformats.org/officeDocument/2006/customXml" ds:itemID="{2C9ABD96-756D-41D3-909F-6F7B4C6B6E1F}">
+  <ds:schemaRefs>
+    <ds:schemaRef ds:uri="ESRI.ArcGIS.Mapping.OfficeIntegration.PowerPointInfo"/>
+  </ds:schemaRefs>
+</ds:datastoreItem>
+</file>
+
+<file path=customXml/itemProps41.xml><?xml version="1.0" encoding="utf-8"?>
+<ds:datastoreItem xmlns:ds="http://schemas.openxmlformats.org/officeDocument/2006/customXml" ds:itemID="{DB399249-DB96-4601-9BA5-97791613CF3A}">
+  <ds:schemaRefs>
+    <ds:schemaRef ds:uri="ESRI.ArcGIS.Mapping.OfficeIntegration.PowerPointInfo"/>
+  </ds:schemaRefs>
+</ds:datastoreItem>
+</file>
+
+<file path=customXml/itemProps42.xml><?xml version="1.0" encoding="utf-8"?>
+<ds:datastoreItem xmlns:ds="http://schemas.openxmlformats.org/officeDocument/2006/customXml" ds:itemID="{A2D97EB6-C9B5-45C6-85A6-D4FE6E1D9856}">
+  <ds:schemaRefs>
+    <ds:schemaRef ds:uri="ESRI.ArcGIS.Mapping.OfficeIntegration.PowerPointInfo"/>
+  </ds:schemaRefs>
+</ds:datastoreItem>
+</file>
+
+<file path=customXml/itemProps43.xml><?xml version="1.0" encoding="utf-8"?>
+<ds:datastoreItem xmlns:ds="http://schemas.openxmlformats.org/officeDocument/2006/customXml" ds:itemID="{E5F80E3B-5636-41B2-898D-5D17189605B7}">
+  <ds:schemaRefs>
+    <ds:schemaRef ds:uri="ESRI.ArcGIS.Mapping.OfficeIntegration.PowerPointInfo"/>
+  </ds:schemaRefs>
+</ds:datastoreItem>
+</file>
+
+<file path=customXml/itemProps44.xml><?xml version="1.0" encoding="utf-8"?>
+<ds:datastoreItem xmlns:ds="http://schemas.openxmlformats.org/officeDocument/2006/customXml" ds:itemID="{4ADFB689-BC87-4869-ADD0-8C3555150450}">
+  <ds:schemaRefs>
+    <ds:schemaRef ds:uri="ESRI.ArcGIS.Mapping.OfficeIntegration.PowerPointInfo"/>
+  </ds:schemaRefs>
+</ds:datastoreItem>
+</file>
+
+<file path=customXml/itemProps45.xml><?xml version="1.0" encoding="utf-8"?>
+<ds:datastoreItem xmlns:ds="http://schemas.openxmlformats.org/officeDocument/2006/customXml" ds:itemID="{DA46DABE-45F1-4E65-A939-497CB70F357D}">
+  <ds:schemaRefs>
+    <ds:schemaRef ds:uri="ESRI.ArcGIS.Mapping.OfficeIntegration.PowerPointInfo"/>
+  </ds:schemaRefs>
+</ds:datastoreItem>
+</file>
+
+<file path=customXml/itemProps46.xml><?xml version="1.0" encoding="utf-8"?>
+<ds:datastoreItem xmlns:ds="http://schemas.openxmlformats.org/officeDocument/2006/customXml" ds:itemID="{352E5095-9B98-4AF0-9861-BDC020ABBCFC}">
+  <ds:schemaRefs>
+    <ds:schemaRef ds:uri="ESRI.ArcGIS.Mapping.OfficeIntegration.PowerPointInfo"/>
+  </ds:schemaRefs>
+</ds:datastoreItem>
+</file>
+
+<file path=customXml/itemProps47.xml><?xml version="1.0" encoding="utf-8"?>
+<ds:datastoreItem xmlns:ds="http://schemas.openxmlformats.org/officeDocument/2006/customXml" ds:itemID="{612F64FD-E61D-43DE-A84B-8FC0DA8FC26C}">
+  <ds:schemaRefs>
+    <ds:schemaRef ds:uri="ESRI.ArcGIS.Mapping.OfficeIntegration.PowerPointInfo"/>
+  </ds:schemaRefs>
+</ds:datastoreItem>
+</file>
+
+<file path=customXml/itemProps48.xml><?xml version="1.0" encoding="utf-8"?>
+<ds:datastoreItem xmlns:ds="http://schemas.openxmlformats.org/officeDocument/2006/customXml" ds:itemID="{EF0D8C03-B10D-4D20-AC38-CA6799A7A314}">
+  <ds:schemaRefs>
+    <ds:schemaRef ds:uri="ESRI.ArcGIS.Mapping.OfficeIntegration.PowerPointInfo"/>
+  </ds:schemaRefs>
+</ds:datastoreItem>
+</file>
+
+<file path=customXml/itemProps49.xml><?xml version="1.0" encoding="utf-8"?>
+<ds:datastoreItem xmlns:ds="http://schemas.openxmlformats.org/officeDocument/2006/customXml" ds:itemID="{81E133DB-697E-4C10-B192-8899027B1EC6}">
+  <ds:schemaRefs>
+    <ds:schemaRef ds:uri="http://purl.org/dc/dcmitype/"/>
+    <ds:schemaRef ds:uri="http://schemas.openxmlformats.org/package/2006/metadata/core-properties"/>
+    <ds:schemaRef ds:uri="http://schemas.microsoft.com/sharepoint/v3"/>
+    <ds:schemaRef ds:uri="http://schemas.microsoft.com/office/2006/metadata/properties"/>
+    <ds:schemaRef ds:uri="http://www.w3.org/XML/1998/namespace"/>
+    <ds:schemaRef ds:uri="http://purl.org/dc/elements/1.1/"/>
+    <ds:schemaRef ds:uri="http://schemas.microsoft.com/office/2006/documentManagement/types"/>
+    <ds:schemaRef ds:uri="http://schemas.microsoft.com/office/infopath/2007/PartnerControls"/>
+    <ds:schemaRef ds:uri="http://purl.org/dc/terms/"/>
+  </ds:schemaRefs>
+</ds:datastoreItem>
+</file>
+
+<file path=customXml/itemProps5.xml><?xml version="1.0" encoding="utf-8"?>
+<ds:datastoreItem xmlns:ds="http://schemas.openxmlformats.org/officeDocument/2006/customXml" ds:itemID="{5A1E471A-DB16-4174-9D85-6F159A344CDB}">
+  <ds:schemaRefs>
+    <ds:schemaRef ds:uri="ESRI.ArcGIS.Mapping.OfficeIntegration.PowerPointInfo"/>
+  </ds:schemaRefs>
+</ds:datastoreItem>
+</file>
+
+<file path=customXml/itemProps50.xml><?xml version="1.0" encoding="utf-8"?>
 <ds:datastoreItem xmlns:ds="http://schemas.openxmlformats.org/officeDocument/2006/customXml" ds:itemID="{8B8D6152-B933-4294-8151-3CF2A1B01FF1}">
   <ds:schemaRefs>
     <ds:schemaRef ds:uri="http://schemas.microsoft.com/office/2006/metadata/contentType"/>
@@ -22127,31 +22468,15 @@
 </ds:datastoreItem>
 </file>
 
-<file path=customXml/itemProps16.xml><?xml version="1.0" encoding="utf-8"?>
-<ds:datastoreItem xmlns:ds="http://schemas.openxmlformats.org/officeDocument/2006/customXml" ds:itemID="{FDE85643-3216-4103-A1BD-63F5E1D42D73}">
+<file path=customXml/itemProps51.xml><?xml version="1.0" encoding="utf-8"?>
+<ds:datastoreItem xmlns:ds="http://schemas.openxmlformats.org/officeDocument/2006/customXml" ds:itemID="{AC4EB402-C456-4A26-8A92-B48606FF9264}">
   <ds:schemaRefs>
     <ds:schemaRef ds:uri="ESRI.ArcGIS.Mapping.OfficeIntegration.PowerPointInfo"/>
   </ds:schemaRefs>
 </ds:datastoreItem>
 </file>
 
-<file path=customXml/itemProps17.xml><?xml version="1.0" encoding="utf-8"?>
-<ds:datastoreItem xmlns:ds="http://schemas.openxmlformats.org/officeDocument/2006/customXml" ds:itemID="{81E133DB-697E-4C10-B192-8899027B1EC6}">
-  <ds:schemaRefs>
-    <ds:schemaRef ds:uri="http://purl.org/dc/dcmitype/"/>
-    <ds:schemaRef ds:uri="http://schemas.openxmlformats.org/package/2006/metadata/core-properties"/>
-    <ds:schemaRef ds:uri="http://schemas.microsoft.com/sharepoint/v3"/>
-    <ds:schemaRef ds:uri="http://schemas.microsoft.com/office/2006/metadata/properties"/>
-    <ds:schemaRef ds:uri="http://www.w3.org/XML/1998/namespace"/>
-    <ds:schemaRef ds:uri="http://purl.org/dc/elements/1.1/"/>
-    <ds:schemaRef ds:uri="http://schemas.microsoft.com/office/2006/documentManagement/types"/>
-    <ds:schemaRef ds:uri="http://schemas.microsoft.com/office/infopath/2007/PartnerControls"/>
-    <ds:schemaRef ds:uri="http://purl.org/dc/terms/"/>
-  </ds:schemaRefs>
-</ds:datastoreItem>
-</file>
-
-<file path=customXml/itemProps18.xml><?xml version="1.0" encoding="utf-8"?>
+<file path=customXml/itemProps52.xml><?xml version="1.0" encoding="utf-8"?>
 <ds:datastoreItem xmlns:ds="http://schemas.openxmlformats.org/officeDocument/2006/customXml" ds:itemID="{4ADFB73A-380D-41FC-8C37-7155886326FA}">
   <ds:schemaRefs>
     <ds:schemaRef ds:uri="ESRI.ArcGIS.Mapping.OfficeIntegration.PowerPointInfo"/>
@@ -22159,63 +22484,63 @@
 </ds:datastoreItem>
 </file>
 
-<file path=customXml/itemProps19.xml><?xml version="1.0" encoding="utf-8"?>
-<ds:datastoreItem xmlns:ds="http://schemas.openxmlformats.org/officeDocument/2006/customXml" ds:itemID="{2FE51124-E413-4DA5-9E06-A6EB32D0C127}">
+<file path=customXml/itemProps53.xml><?xml version="1.0" encoding="utf-8"?>
+<ds:datastoreItem xmlns:ds="http://schemas.openxmlformats.org/officeDocument/2006/customXml" ds:itemID="{328DCA66-548E-4424-83E1-09FFD45EE4B0}">
   <ds:schemaRefs>
     <ds:schemaRef ds:uri="ESRI.ArcGIS.Mapping.OfficeIntegration.PowerPointInfo"/>
   </ds:schemaRefs>
 </ds:datastoreItem>
 </file>
 
-<file path=customXml/itemProps2.xml><?xml version="1.0" encoding="utf-8"?>
-<ds:datastoreItem xmlns:ds="http://schemas.openxmlformats.org/officeDocument/2006/customXml" ds:itemID="{B7E6AAC2-10E8-4F0C-BCC5-34BD332F8972}">
+<file path=customXml/itemProps54.xml><?xml version="1.0" encoding="utf-8"?>
+<ds:datastoreItem xmlns:ds="http://schemas.openxmlformats.org/officeDocument/2006/customXml" ds:itemID="{905F88FE-324F-4FBE-89BB-9CEE04D6CACF}">
   <ds:schemaRefs>
     <ds:schemaRef ds:uri="ESRI.ArcGIS.Mapping.OfficeIntegration.PowerPointInfo"/>
   </ds:schemaRefs>
 </ds:datastoreItem>
 </file>
 
-<file path=customXml/itemProps20.xml><?xml version="1.0" encoding="utf-8"?>
-<ds:datastoreItem xmlns:ds="http://schemas.openxmlformats.org/officeDocument/2006/customXml" ds:itemID="{94844715-80D4-4BDB-8DF0-52D9314E2485}">
+<file path=customXml/itemProps55.xml><?xml version="1.0" encoding="utf-8"?>
+<ds:datastoreItem xmlns:ds="http://schemas.openxmlformats.org/officeDocument/2006/customXml" ds:itemID="{653D88A7-0F5E-41C5-A5C5-47DF37C594C5}">
   <ds:schemaRefs>
     <ds:schemaRef ds:uri="ESRI.ArcGIS.Mapping.OfficeIntegration.PowerPointInfo"/>
   </ds:schemaRefs>
 </ds:datastoreItem>
 </file>
 
-<file path=customXml/itemProps21.xml><?xml version="1.0" encoding="utf-8"?>
-<ds:datastoreItem xmlns:ds="http://schemas.openxmlformats.org/officeDocument/2006/customXml" ds:itemID="{039A5E78-EC42-40DE-A05E-1C7FCA140310}">
+<file path=customXml/itemProps56.xml><?xml version="1.0" encoding="utf-8"?>
+<ds:datastoreItem xmlns:ds="http://schemas.openxmlformats.org/officeDocument/2006/customXml" ds:itemID="{71658D62-F010-45F1-9326-EDC465FED48E}">
   <ds:schemaRefs>
     <ds:schemaRef ds:uri="ESRI.ArcGIS.Mapping.OfficeIntegration.PowerPointInfo"/>
   </ds:schemaRefs>
 </ds:datastoreItem>
 </file>
 
-<file path=customXml/itemProps22.xml><?xml version="1.0" encoding="utf-8"?>
-<ds:datastoreItem xmlns:ds="http://schemas.openxmlformats.org/officeDocument/2006/customXml" ds:itemID="{7147CA22-2BC4-4917-83D2-7CA4C34A80D4}">
+<file path=customXml/itemProps57.xml><?xml version="1.0" encoding="utf-8"?>
+<ds:datastoreItem xmlns:ds="http://schemas.openxmlformats.org/officeDocument/2006/customXml" ds:itemID="{33F5FE6F-FF86-471A-919E-6C74E3669390}">
   <ds:schemaRefs>
     <ds:schemaRef ds:uri="ESRI.ArcGIS.Mapping.OfficeIntegration.PowerPointInfo"/>
   </ds:schemaRefs>
 </ds:datastoreItem>
 </file>
 
-<file path=customXml/itemProps23.xml><?xml version="1.0" encoding="utf-8"?>
-<ds:datastoreItem xmlns:ds="http://schemas.openxmlformats.org/officeDocument/2006/customXml" ds:itemID="{9E56F111-9E55-4604-91C2-8352AE933430}">
+<file path=customXml/itemProps58.xml><?xml version="1.0" encoding="utf-8"?>
+<ds:datastoreItem xmlns:ds="http://schemas.openxmlformats.org/officeDocument/2006/customXml" ds:itemID="{E1A338E5-2E37-4973-87E6-4C02B0B7F460}">
+  <ds:schemaRefs>
+    <ds:schemaRef ds:uri="http://schemas.microsoft.com/sharepoint/v3/contenttype/forms"/>
+  </ds:schemaRefs>
+</ds:datastoreItem>
+</file>
+
+<file path=customXml/itemProps59.xml><?xml version="1.0" encoding="utf-8"?>
+<ds:datastoreItem xmlns:ds="http://schemas.openxmlformats.org/officeDocument/2006/customXml" ds:itemID="{16EF6D11-DC4F-410C-A4BF-DF081B432591}">
   <ds:schemaRefs>
     <ds:schemaRef ds:uri="ESRI.ArcGIS.Mapping.OfficeIntegration.PowerPointInfo"/>
   </ds:schemaRefs>
 </ds:datastoreItem>
 </file>
 
-<file path=customXml/itemProps24.xml><?xml version="1.0" encoding="utf-8"?>
-<ds:datastoreItem xmlns:ds="http://schemas.openxmlformats.org/officeDocument/2006/customXml" ds:itemID="{DB399249-DB96-4601-9BA5-97791613CF3A}">
-  <ds:schemaRefs>
-    <ds:schemaRef ds:uri="ESRI.ArcGIS.Mapping.OfficeIntegration.PowerPointInfo"/>
-  </ds:schemaRefs>
-</ds:datastoreItem>
-</file>
-
-<file path=customXml/itemProps25.xml><?xml version="1.0" encoding="utf-8"?>
+<file path=customXml/itemProps6.xml><?xml version="1.0" encoding="utf-8"?>
 <ds:datastoreItem xmlns:ds="http://schemas.openxmlformats.org/officeDocument/2006/customXml" ds:itemID="{8EED6C1C-A455-42E4-8CBE-649F5A755068}">
   <ds:schemaRefs>
     <ds:schemaRef ds:uri="ESRI.ArcGIS.Mapping.OfficeIntegration.PowerPointInfo"/>
@@ -22223,47 +22548,15 @@
 </ds:datastoreItem>
 </file>
 
-<file path=customXml/itemProps26.xml><?xml version="1.0" encoding="utf-8"?>
-<ds:datastoreItem xmlns:ds="http://schemas.openxmlformats.org/officeDocument/2006/customXml" ds:itemID="{22A42D4B-0AAE-44C9-A2EF-48BDE1C5260A}">
+<file path=customXml/itemProps60.xml><?xml version="1.0" encoding="utf-8"?>
+<ds:datastoreItem xmlns:ds="http://schemas.openxmlformats.org/officeDocument/2006/customXml" ds:itemID="{2672FF5B-1ADC-45B0-9698-61421F5761E7}">
   <ds:schemaRefs>
     <ds:schemaRef ds:uri="ESRI.ArcGIS.Mapping.OfficeIntegration.PowerPointInfo"/>
   </ds:schemaRefs>
 </ds:datastoreItem>
 </file>
 
-<file path=customXml/itemProps27.xml><?xml version="1.0" encoding="utf-8"?>
-<ds:datastoreItem xmlns:ds="http://schemas.openxmlformats.org/officeDocument/2006/customXml" ds:itemID="{D6F15B81-7660-4E9F-B613-8AA4F84B6DA3}">
-  <ds:schemaRefs>
-    <ds:schemaRef ds:uri="ESRI.ArcGIS.Mapping.OfficeIntegration.PowerPointInfo"/>
-  </ds:schemaRefs>
-</ds:datastoreItem>
-</file>
-
-<file path=customXml/itemProps28.xml><?xml version="1.0" encoding="utf-8"?>
-<ds:datastoreItem xmlns:ds="http://schemas.openxmlformats.org/officeDocument/2006/customXml" ds:itemID="{7684026F-E81F-4167-824A-3AA1BAEAE133}">
-  <ds:schemaRefs>
-    <ds:schemaRef ds:uri="ESRI.ArcGIS.Mapping.OfficeIntegration.PowerPointInfo"/>
-  </ds:schemaRefs>
-</ds:datastoreItem>
-</file>
-
-<file path=customXml/itemProps29.xml><?xml version="1.0" encoding="utf-8"?>
-<ds:datastoreItem xmlns:ds="http://schemas.openxmlformats.org/officeDocument/2006/customXml" ds:itemID="{905F88FE-324F-4FBE-89BB-9CEE04D6CACF}">
-  <ds:schemaRefs>
-    <ds:schemaRef ds:uri="ESRI.ArcGIS.Mapping.OfficeIntegration.PowerPointInfo"/>
-  </ds:schemaRefs>
-</ds:datastoreItem>
-</file>
-
-<file path=customXml/itemProps3.xml><?xml version="1.0" encoding="utf-8"?>
-<ds:datastoreItem xmlns:ds="http://schemas.openxmlformats.org/officeDocument/2006/customXml" ds:itemID="{C1BF2448-6CBA-44DB-9E22-BED59BA834DF}">
-  <ds:schemaRefs>
-    <ds:schemaRef ds:uri="ESRI.ArcGIS.Mapping.OfficeIntegration.PowerPointInfo"/>
-  </ds:schemaRefs>
-</ds:datastoreItem>
-</file>
-
-<file path=customXml/itemProps30.xml><?xml version="1.0" encoding="utf-8"?>
+<file path=customXml/itemProps61.xml><?xml version="1.0" encoding="utf-8"?>
 <ds:datastoreItem xmlns:ds="http://schemas.openxmlformats.org/officeDocument/2006/customXml" ds:itemID="{55235559-86B9-428B-8DAF-8EE6262226D5}">
   <ds:schemaRefs>
     <ds:schemaRef ds:uri="ESRI.ArcGIS.Mapping.OfficeIntegration.PowerPointInfo"/>
@@ -22271,63 +22564,7 @@
 </ds:datastoreItem>
 </file>
 
-<file path=customXml/itemProps31.xml><?xml version="1.0" encoding="utf-8"?>
-<ds:datastoreItem xmlns:ds="http://schemas.openxmlformats.org/officeDocument/2006/customXml" ds:itemID="{53220D22-8257-492D-8F60-ECE474D7C478}">
-  <ds:schemaRefs>
-    <ds:schemaRef ds:uri="ESRI.ArcGIS.Mapping.OfficeIntegration.PowerPointInfo"/>
-  </ds:schemaRefs>
-</ds:datastoreItem>
-</file>
-
-<file path=customXml/itemProps32.xml><?xml version="1.0" encoding="utf-8"?>
-<ds:datastoreItem xmlns:ds="http://schemas.openxmlformats.org/officeDocument/2006/customXml" ds:itemID="{6D2D132B-596B-4D69-A43B-566EB6C10C03}">
-  <ds:schemaRefs>
-    <ds:schemaRef ds:uri="ESRI.ArcGIS.Mapping.OfficeIntegration.PowerPointInfo"/>
-  </ds:schemaRefs>
-</ds:datastoreItem>
-</file>
-
-<file path=customXml/itemProps33.xml><?xml version="1.0" encoding="utf-8"?>
-<ds:datastoreItem xmlns:ds="http://schemas.openxmlformats.org/officeDocument/2006/customXml" ds:itemID="{76859AF2-E75C-459B-8657-EEEA80BC8153}">
-  <ds:schemaRefs>
-    <ds:schemaRef ds:uri="ESRI.ArcGIS.Mapping.OfficeIntegration.PowerPointInfo"/>
-  </ds:schemaRefs>
-</ds:datastoreItem>
-</file>
-
-<file path=customXml/itemProps34.xml><?xml version="1.0" encoding="utf-8"?>
-<ds:datastoreItem xmlns:ds="http://schemas.openxmlformats.org/officeDocument/2006/customXml" ds:itemID="{E559A846-F914-4753-A2DC-D33AFE44114C}">
-  <ds:schemaRefs>
-    <ds:schemaRef ds:uri="ESRI.ArcGIS.Mapping.OfficeIntegration.PowerPointInfo"/>
-  </ds:schemaRefs>
-</ds:datastoreItem>
-</file>
-
-<file path=customXml/itemProps35.xml><?xml version="1.0" encoding="utf-8"?>
-<ds:datastoreItem xmlns:ds="http://schemas.openxmlformats.org/officeDocument/2006/customXml" ds:itemID="{C4AF463C-FA8B-436D-9853-3318650FDAB8}">
-  <ds:schemaRefs>
-    <ds:schemaRef ds:uri="ESRI.ArcGIS.Mapping.OfficeIntegration.PowerPointInfo"/>
-  </ds:schemaRefs>
-</ds:datastoreItem>
-</file>
-
-<file path=customXml/itemProps36.xml><?xml version="1.0" encoding="utf-8"?>
-<ds:datastoreItem xmlns:ds="http://schemas.openxmlformats.org/officeDocument/2006/customXml" ds:itemID="{16EF6D11-DC4F-410C-A4BF-DF081B432591}">
-  <ds:schemaRefs>
-    <ds:schemaRef ds:uri="ESRI.ArcGIS.Mapping.OfficeIntegration.PowerPointInfo"/>
-  </ds:schemaRefs>
-</ds:datastoreItem>
-</file>
-
-<file path=customXml/itemProps37.xml><?xml version="1.0" encoding="utf-8"?>
-<ds:datastoreItem xmlns:ds="http://schemas.openxmlformats.org/officeDocument/2006/customXml" ds:itemID="{F6EFD530-1E3E-47B8-A55C-19EC63E3C655}">
-  <ds:schemaRefs>
-    <ds:schemaRef ds:uri="ESRI.ArcGIS.Mapping.OfficeIntegration.PowerPointInfo"/>
-  </ds:schemaRefs>
-</ds:datastoreItem>
-</file>
-
-<file path=customXml/itemProps38.xml><?xml version="1.0" encoding="utf-8"?>
+<file path=customXml/itemProps62.xml><?xml version="1.0" encoding="utf-8"?>
 <ds:datastoreItem xmlns:ds="http://schemas.openxmlformats.org/officeDocument/2006/customXml" ds:itemID="{E47732B9-9C1B-4723-B4AA-A21238C5DF44}">
   <ds:schemaRefs>
     <ds:schemaRef ds:uri="ESRI.ArcGIS.Mapping.OfficeIntegration.PowerPointInfo"/>
@@ -22335,224 +22572,8 @@
 </ds:datastoreItem>
 </file>
 
-<file path=customXml/itemProps39.xml><?xml version="1.0" encoding="utf-8"?>
-<ds:datastoreItem xmlns:ds="http://schemas.openxmlformats.org/officeDocument/2006/customXml" ds:itemID="{EE9F405B-FE7A-4AB8-9CB8-9A75FBA69A95}">
-  <ds:schemaRefs>
-    <ds:schemaRef ds:uri="ESRI.ArcGIS.Mapping.OfficeIntegration.PowerPointInfo"/>
-  </ds:schemaRefs>
-</ds:datastoreItem>
-</file>
-
-<file path=customXml/itemProps4.xml><?xml version="1.0" encoding="utf-8"?>
-<ds:datastoreItem xmlns:ds="http://schemas.openxmlformats.org/officeDocument/2006/customXml" ds:itemID="{3E253610-1BBE-4C16-A1DA-4D6F07A3A74E}">
-  <ds:schemaRefs>
-    <ds:schemaRef ds:uri="ESRI.ArcGIS.Mapping.OfficeIntegration.PowerPointInfo"/>
-  </ds:schemaRefs>
-</ds:datastoreItem>
-</file>
-
-<file path=customXml/itemProps40.xml><?xml version="1.0" encoding="utf-8"?>
-<ds:datastoreItem xmlns:ds="http://schemas.openxmlformats.org/officeDocument/2006/customXml" ds:itemID="{EF0D8C03-B10D-4D20-AC38-CA6799A7A314}">
-  <ds:schemaRefs>
-    <ds:schemaRef ds:uri="ESRI.ArcGIS.Mapping.OfficeIntegration.PowerPointInfo"/>
-  </ds:schemaRefs>
-</ds:datastoreItem>
-</file>
-
-<file path=customXml/itemProps41.xml><?xml version="1.0" encoding="utf-8"?>
-<ds:datastoreItem xmlns:ds="http://schemas.openxmlformats.org/officeDocument/2006/customXml" ds:itemID="{E1A338E5-2E37-4973-87E6-4C02B0B7F460}">
-  <ds:schemaRefs>
-    <ds:schemaRef ds:uri="http://schemas.microsoft.com/sharepoint/v3/contenttype/forms"/>
-  </ds:schemaRefs>
-</ds:datastoreItem>
-</file>
-
-<file path=customXml/itemProps42.xml><?xml version="1.0" encoding="utf-8"?>
-<ds:datastoreItem xmlns:ds="http://schemas.openxmlformats.org/officeDocument/2006/customXml" ds:itemID="{328DCA66-548E-4424-83E1-09FFD45EE4B0}">
-  <ds:schemaRefs>
-    <ds:schemaRef ds:uri="ESRI.ArcGIS.Mapping.OfficeIntegration.PowerPointInfo"/>
-  </ds:schemaRefs>
-</ds:datastoreItem>
-</file>
-
-<file path=customXml/itemProps43.xml><?xml version="1.0" encoding="utf-8"?>
-<ds:datastoreItem xmlns:ds="http://schemas.openxmlformats.org/officeDocument/2006/customXml" ds:itemID="{E5F80E3B-5636-41B2-898D-5D17189605B7}">
-  <ds:schemaRefs>
-    <ds:schemaRef ds:uri="ESRI.ArcGIS.Mapping.OfficeIntegration.PowerPointInfo"/>
-  </ds:schemaRefs>
-</ds:datastoreItem>
-</file>
-
-<file path=customXml/itemProps44.xml><?xml version="1.0" encoding="utf-8"?>
-<ds:datastoreItem xmlns:ds="http://schemas.openxmlformats.org/officeDocument/2006/customXml" ds:itemID="{AC4EB402-C456-4A26-8A92-B48606FF9264}">
-  <ds:schemaRefs>
-    <ds:schemaRef ds:uri="ESRI.ArcGIS.Mapping.OfficeIntegration.PowerPointInfo"/>
-  </ds:schemaRefs>
-</ds:datastoreItem>
-</file>
-
-<file path=customXml/itemProps45.xml><?xml version="1.0" encoding="utf-8"?>
-<ds:datastoreItem xmlns:ds="http://schemas.openxmlformats.org/officeDocument/2006/customXml" ds:itemID="{9E8787D6-C7B8-48EC-8C13-4069AE6320BD}">
-  <ds:schemaRefs>
-    <ds:schemaRef ds:uri="ESRI.ArcGIS.Mapping.OfficeIntegration.PowerPointInfo"/>
-  </ds:schemaRefs>
-</ds:datastoreItem>
-</file>
-
-<file path=customXml/itemProps46.xml><?xml version="1.0" encoding="utf-8"?>
-<ds:datastoreItem xmlns:ds="http://schemas.openxmlformats.org/officeDocument/2006/customXml" ds:itemID="{D4E2A01F-BEC1-4558-9AD1-A87ED70D910B}">
-  <ds:schemaRefs>
-    <ds:schemaRef ds:uri="ESRI.ArcGIS.Mapping.OfficeIntegration.PowerPointInfo"/>
-  </ds:schemaRefs>
-</ds:datastoreItem>
-</file>
-
-<file path=customXml/itemProps47.xml><?xml version="1.0" encoding="utf-8"?>
-<ds:datastoreItem xmlns:ds="http://schemas.openxmlformats.org/officeDocument/2006/customXml" ds:itemID="{B0302D17-5923-4CC0-9EB4-0E57930F5A8E}">
-  <ds:schemaRefs>
-    <ds:schemaRef ds:uri="ESRI.ArcGIS.Mapping.OfficeIntegration.PowerPointInfo"/>
-  </ds:schemaRefs>
-</ds:datastoreItem>
-</file>
-
-<file path=customXml/itemProps48.xml><?xml version="1.0" encoding="utf-8"?>
-<ds:datastoreItem xmlns:ds="http://schemas.openxmlformats.org/officeDocument/2006/customXml" ds:itemID="{5A1E471A-DB16-4174-9D85-6F159A344CDB}">
-  <ds:schemaRefs>
-    <ds:schemaRef ds:uri="ESRI.ArcGIS.Mapping.OfficeIntegration.PowerPointInfo"/>
-  </ds:schemaRefs>
-</ds:datastoreItem>
-</file>
-
-<file path=customXml/itemProps49.xml><?xml version="1.0" encoding="utf-8"?>
-<ds:datastoreItem xmlns:ds="http://schemas.openxmlformats.org/officeDocument/2006/customXml" ds:itemID="{DE4ACD9E-0233-451D-890D-5732E05DB574}">
-  <ds:schemaRefs>
-    <ds:schemaRef ds:uri="ESRI.ArcGIS.Mapping.OfficeIntegration.PowerPointInfo"/>
-  </ds:schemaRefs>
-</ds:datastoreItem>
-</file>
-
-<file path=customXml/itemProps5.xml><?xml version="1.0" encoding="utf-8"?>
-<ds:datastoreItem xmlns:ds="http://schemas.openxmlformats.org/officeDocument/2006/customXml" ds:itemID="{A2D97EB6-C9B5-45C6-85A6-D4FE6E1D9856}">
-  <ds:schemaRefs>
-    <ds:schemaRef ds:uri="ESRI.ArcGIS.Mapping.OfficeIntegration.PowerPointInfo"/>
-  </ds:schemaRefs>
-</ds:datastoreItem>
-</file>
-
-<file path=customXml/itemProps50.xml><?xml version="1.0" encoding="utf-8"?>
-<ds:datastoreItem xmlns:ds="http://schemas.openxmlformats.org/officeDocument/2006/customXml" ds:itemID="{18DF8D07-6137-4D85-8010-4650942E033A}">
-  <ds:schemaRefs>
-    <ds:schemaRef ds:uri="ESRI.ArcGIS.Mapping.OfficeIntegration.PowerPointInfo"/>
-  </ds:schemaRefs>
-</ds:datastoreItem>
-</file>
-
-<file path=customXml/itemProps51.xml><?xml version="1.0" encoding="utf-8"?>
-<ds:datastoreItem xmlns:ds="http://schemas.openxmlformats.org/officeDocument/2006/customXml" ds:itemID="{4ADFB689-BC87-4869-ADD0-8C3555150450}">
-  <ds:schemaRefs>
-    <ds:schemaRef ds:uri="ESRI.ArcGIS.Mapping.OfficeIntegration.PowerPointInfo"/>
-  </ds:schemaRefs>
-</ds:datastoreItem>
-</file>
-
-<file path=customXml/itemProps52.xml><?xml version="1.0" encoding="utf-8"?>
-<ds:datastoreItem xmlns:ds="http://schemas.openxmlformats.org/officeDocument/2006/customXml" ds:itemID="{5B58CDD1-2BF6-415B-A256-DBBCC6A48D56}">
-  <ds:schemaRefs>
-    <ds:schemaRef ds:uri="ESRI.ArcGIS.Mapping.OfficeIntegration.PowerPointInfo"/>
-  </ds:schemaRefs>
-</ds:datastoreItem>
-</file>
-
-<file path=customXml/itemProps53.xml><?xml version="1.0" encoding="utf-8"?>
-<ds:datastoreItem xmlns:ds="http://schemas.openxmlformats.org/officeDocument/2006/customXml" ds:itemID="{86B5FFB5-BF2F-45EA-BC75-C41726A8F251}">
-  <ds:schemaRefs>
-    <ds:schemaRef ds:uri="ESRI.ArcGIS.Mapping.OfficeIntegration.PowerPointInfo"/>
-  </ds:schemaRefs>
-</ds:datastoreItem>
-</file>
-
-<file path=customXml/itemProps54.xml><?xml version="1.0" encoding="utf-8"?>
-<ds:datastoreItem xmlns:ds="http://schemas.openxmlformats.org/officeDocument/2006/customXml" ds:itemID="{C3102E66-5C5A-4AAF-9C94-24819091B61E}">
-  <ds:schemaRefs>
-    <ds:schemaRef ds:uri="ESRI.ArcGIS.Mapping.OfficeIntegration.PowerPointInfo"/>
-  </ds:schemaRefs>
-</ds:datastoreItem>
-</file>
-
-<file path=customXml/itemProps55.xml><?xml version="1.0" encoding="utf-8"?>
-<ds:datastoreItem xmlns:ds="http://schemas.openxmlformats.org/officeDocument/2006/customXml" ds:itemID="{4617AF64-94DB-48BB-8BE2-3BCF6B12593F}">
-  <ds:schemaRefs>
-    <ds:schemaRef ds:uri="ESRI.ArcGIS.Mapping.OfficeIntegration.PowerPointInfo"/>
-  </ds:schemaRefs>
-</ds:datastoreItem>
-</file>
-
-<file path=customXml/itemProps56.xml><?xml version="1.0" encoding="utf-8"?>
-<ds:datastoreItem xmlns:ds="http://schemas.openxmlformats.org/officeDocument/2006/customXml" ds:itemID="{998905D7-FE59-48DE-A74A-5B0009B7827F}">
-  <ds:schemaRefs>
-    <ds:schemaRef ds:uri="ESRI.ArcGIS.Mapping.OfficeIntegration.PowerPointInfo"/>
-  </ds:schemaRefs>
-</ds:datastoreItem>
-</file>
-
-<file path=customXml/itemProps57.xml><?xml version="1.0" encoding="utf-8"?>
-<ds:datastoreItem xmlns:ds="http://schemas.openxmlformats.org/officeDocument/2006/customXml" ds:itemID="{352E5095-9B98-4AF0-9861-BDC020ABBCFC}">
-  <ds:schemaRefs>
-    <ds:schemaRef ds:uri="ESRI.ArcGIS.Mapping.OfficeIntegration.PowerPointInfo"/>
-  </ds:schemaRefs>
-</ds:datastoreItem>
-</file>
-
-<file path=customXml/itemProps58.xml><?xml version="1.0" encoding="utf-8"?>
-<ds:datastoreItem xmlns:ds="http://schemas.openxmlformats.org/officeDocument/2006/customXml" ds:itemID="{653D88A7-0F5E-41C5-A5C5-47DF37C594C5}">
-  <ds:schemaRefs>
-    <ds:schemaRef ds:uri="ESRI.ArcGIS.Mapping.OfficeIntegration.PowerPointInfo"/>
-  </ds:schemaRefs>
-</ds:datastoreItem>
-</file>
-
-<file path=customXml/itemProps59.xml><?xml version="1.0" encoding="utf-8"?>
-<ds:datastoreItem xmlns:ds="http://schemas.openxmlformats.org/officeDocument/2006/customXml" ds:itemID="{DA46DABE-45F1-4E65-A939-497CB70F357D}">
-  <ds:schemaRefs>
-    <ds:schemaRef ds:uri="ESRI.ArcGIS.Mapping.OfficeIntegration.PowerPointInfo"/>
-  </ds:schemaRefs>
-</ds:datastoreItem>
-</file>
-
-<file path=customXml/itemProps6.xml><?xml version="1.0" encoding="utf-8"?>
-<ds:datastoreItem xmlns:ds="http://schemas.openxmlformats.org/officeDocument/2006/customXml" ds:itemID="{EB8D7141-3508-4B4E-8051-37E3E4C09D17}">
-  <ds:schemaRefs>
-    <ds:schemaRef ds:uri="ESRI.ArcGIS.Mapping.OfficeIntegration.PowerPointInfo"/>
-  </ds:schemaRefs>
-</ds:datastoreItem>
-</file>
-
-<file path=customXml/itemProps60.xml><?xml version="1.0" encoding="utf-8"?>
-<ds:datastoreItem xmlns:ds="http://schemas.openxmlformats.org/officeDocument/2006/customXml" ds:itemID="{F29452FE-972E-43F8-B54C-969F4C69C00B}">
-  <ds:schemaRefs>
-    <ds:schemaRef ds:uri="ESRI.ArcGIS.Mapping.OfficeIntegration.PowerPointInfo"/>
-  </ds:schemaRefs>
-</ds:datastoreItem>
-</file>
-
-<file path=customXml/itemProps61.xml><?xml version="1.0" encoding="utf-8"?>
-<ds:datastoreItem xmlns:ds="http://schemas.openxmlformats.org/officeDocument/2006/customXml" ds:itemID="{E940B40D-12DB-4BFA-BBB6-2269FD71FF92}">
-  <ds:schemaRefs>
-    <ds:schemaRef ds:uri="ESRI.ArcGIS.Mapping.OfficeIntegration.PowerPointInfo"/>
-  </ds:schemaRefs>
-</ds:datastoreItem>
-</file>
-
-<file path=customXml/itemProps62.xml><?xml version="1.0" encoding="utf-8"?>
-<ds:datastoreItem xmlns:ds="http://schemas.openxmlformats.org/officeDocument/2006/customXml" ds:itemID="{D32008F3-64AC-45EB-A05B-F6120AE62290}">
-  <ds:schemaRefs>
-    <ds:schemaRef ds:uri="ESRI.ArcGIS.Mapping.OfficeIntegration.PowerPointInfo"/>
-  </ds:schemaRefs>
-</ds:datastoreItem>
-</file>
-
 <file path=customXml/itemProps63.xml><?xml version="1.0" encoding="utf-8"?>
-<ds:datastoreItem xmlns:ds="http://schemas.openxmlformats.org/officeDocument/2006/customXml" ds:itemID="{2672FF5B-1ADC-45B0-9698-61421F5761E7}">
+<ds:datastoreItem xmlns:ds="http://schemas.openxmlformats.org/officeDocument/2006/customXml" ds:itemID="{7A70D44C-B768-49FE-A70F-C6199D3EE9A7}">
   <ds:schemaRefs>
     <ds:schemaRef ds:uri="ESRI.ArcGIS.Mapping.OfficeIntegration.PowerPointInfo"/>
   </ds:schemaRefs>
@@ -22560,7 +22581,7 @@
 </file>
 
 <file path=customXml/itemProps64.xml><?xml version="1.0" encoding="utf-8"?>
-<ds:datastoreItem xmlns:ds="http://schemas.openxmlformats.org/officeDocument/2006/customXml" ds:itemID="{33F5FE6F-FF86-471A-919E-6C74E3669390}">
+<ds:datastoreItem xmlns:ds="http://schemas.openxmlformats.org/officeDocument/2006/customXml" ds:itemID="{AE5A340C-916E-449C-AA30-CD41B151A0D4}">
   <ds:schemaRefs>
     <ds:schemaRef ds:uri="ESRI.ArcGIS.Mapping.OfficeIntegration.PowerPointInfo"/>
   </ds:schemaRefs>
@@ -22576,7 +22597,7 @@
 </file>
 
 <file path=customXml/itemProps66.xml><?xml version="1.0" encoding="utf-8"?>
-<ds:datastoreItem xmlns:ds="http://schemas.openxmlformats.org/officeDocument/2006/customXml" ds:itemID="{A77C5B54-CA1C-4010-8D5D-ED406825EBB7}">
+<ds:datastoreItem xmlns:ds="http://schemas.openxmlformats.org/officeDocument/2006/customXml" ds:itemID="{039A5E78-EC42-40DE-A05E-1C7FCA140310}">
   <ds:schemaRefs>
     <ds:schemaRef ds:uri="ESRI.ArcGIS.Mapping.OfficeIntegration.PowerPointInfo"/>
   </ds:schemaRefs>
@@ -22584,6 +22605,22 @@
 </file>
 
 <file path=customXml/itemProps67.xml><?xml version="1.0" encoding="utf-8"?>
+<ds:datastoreItem xmlns:ds="http://schemas.openxmlformats.org/officeDocument/2006/customXml" ds:itemID="{4617AF64-94DB-48BB-8BE2-3BCF6B12593F}">
+  <ds:schemaRefs>
+    <ds:schemaRef ds:uri="ESRI.ArcGIS.Mapping.OfficeIntegration.PowerPointInfo"/>
+  </ds:schemaRefs>
+</ds:datastoreItem>
+</file>
+
+<file path=customXml/itemProps68.xml><?xml version="1.0" encoding="utf-8"?>
+<ds:datastoreItem xmlns:ds="http://schemas.openxmlformats.org/officeDocument/2006/customXml" ds:itemID="{B7E6AAC2-10E8-4F0C-BCC5-34BD332F8972}">
+  <ds:schemaRefs>
+    <ds:schemaRef ds:uri="ESRI.ArcGIS.Mapping.OfficeIntegration.PowerPointInfo"/>
+  </ds:schemaRefs>
+</ds:datastoreItem>
+</file>
+
+<file path=customXml/itemProps7.xml><?xml version="1.0" encoding="utf-8"?>
 <ds:datastoreItem xmlns:ds="http://schemas.openxmlformats.org/officeDocument/2006/customXml" ds:itemID="{10846DB9-88C0-41D7-ACE4-BEC3A7488A03}">
   <ds:schemaRefs>
     <ds:schemaRef ds:uri="ESRI.ArcGIS.Mapping.OfficeIntegration.PowerPointInfo"/>
@@ -22591,24 +22628,8 @@
 </ds:datastoreItem>
 </file>
 
-<file path=customXml/itemProps68.xml><?xml version="1.0" encoding="utf-8"?>
-<ds:datastoreItem xmlns:ds="http://schemas.openxmlformats.org/officeDocument/2006/customXml" ds:itemID="{AB25B40B-929A-4CD0-B9AB-7142442027B6}">
-  <ds:schemaRefs>
-    <ds:schemaRef ds:uri="ESRI.ArcGIS.Mapping.OfficeIntegration.PowerPointInfo"/>
-  </ds:schemaRefs>
-</ds:datastoreItem>
-</file>
-
-<file path=customXml/itemProps7.xml><?xml version="1.0" encoding="utf-8"?>
-<ds:datastoreItem xmlns:ds="http://schemas.openxmlformats.org/officeDocument/2006/customXml" ds:itemID="{2C9ABD96-756D-41D3-909F-6F7B4C6B6E1F}">
-  <ds:schemaRefs>
-    <ds:schemaRef ds:uri="ESRI.ArcGIS.Mapping.OfficeIntegration.PowerPointInfo"/>
-  </ds:schemaRefs>
-</ds:datastoreItem>
-</file>
-
 <file path=customXml/itemProps8.xml><?xml version="1.0" encoding="utf-8"?>
-<ds:datastoreItem xmlns:ds="http://schemas.openxmlformats.org/officeDocument/2006/customXml" ds:itemID="{C9037CA3-5499-457D-8238-F29CBEBDF143}">
+<ds:datastoreItem xmlns:ds="http://schemas.openxmlformats.org/officeDocument/2006/customXml" ds:itemID="{C3102E66-5C5A-4AAF-9C94-24819091B61E}">
   <ds:schemaRefs>
     <ds:schemaRef ds:uri="ESRI.ArcGIS.Mapping.OfficeIntegration.PowerPointInfo"/>
   </ds:schemaRefs>
@@ -22616,7 +22637,7 @@
 </file>
 
 <file path=customXml/itemProps9.xml><?xml version="1.0" encoding="utf-8"?>
-<ds:datastoreItem xmlns:ds="http://schemas.openxmlformats.org/officeDocument/2006/customXml" ds:itemID="{612F64FD-E61D-43DE-A84B-8FC0DA8FC26C}">
+<ds:datastoreItem xmlns:ds="http://schemas.openxmlformats.org/officeDocument/2006/customXml" ds:itemID="{9E56F111-9E55-4604-91C2-8352AE933430}">
   <ds:schemaRefs>
     <ds:schemaRef ds:uri="ESRI.ArcGIS.Mapping.OfficeIntegration.PowerPointInfo"/>
   </ds:schemaRefs>

</xml_diff>